<commit_message>
add .md for grpc
</commit_message>
<xml_diff>
--- a/raspberry-pi-report/gRPCについて.pptx
+++ b/raspberry-pi-report/gRPCについて.pptx
@@ -11,11 +11,11 @@
     <p:sldId id="256" r:id="rId2"/>
     <p:sldId id="271" r:id="rId3"/>
     <p:sldId id="285" r:id="rId4"/>
-    <p:sldId id="272" r:id="rId5"/>
-    <p:sldId id="290" r:id="rId6"/>
-    <p:sldId id="286" r:id="rId7"/>
-    <p:sldId id="287" r:id="rId8"/>
-    <p:sldId id="288" r:id="rId9"/>
+    <p:sldId id="288" r:id="rId5"/>
+    <p:sldId id="272" r:id="rId6"/>
+    <p:sldId id="290" r:id="rId7"/>
+    <p:sldId id="286" r:id="rId8"/>
+    <p:sldId id="287" r:id="rId9"/>
     <p:sldId id="289" r:id="rId10"/>
     <p:sldId id="291" r:id="rId11"/>
   </p:sldIdLst>
@@ -1722,6 +1722,281 @@
     </pc:docChg>
   </pc:docChgLst>
   <pc:docChgLst>
+    <pc:chgData name="Yoshiharu Hamaguchi" userId="470e288704938fe9" providerId="LiveId" clId="{70332866-803F-45E9-A120-6101FBB807E0}"/>
+    <pc:docChg chg="undo custSel addSld delSld modSld">
+      <pc:chgData name="Yoshiharu Hamaguchi" userId="470e288704938fe9" providerId="LiveId" clId="{70332866-803F-45E9-A120-6101FBB807E0}" dt="2025-09-08T14:56:44.792" v="4266"/>
+      <pc:docMkLst>
+        <pc:docMk/>
+      </pc:docMkLst>
+      <pc:sldChg chg="modSp mod">
+        <pc:chgData name="Yoshiharu Hamaguchi" userId="470e288704938fe9" providerId="LiveId" clId="{70332866-803F-45E9-A120-6101FBB807E0}" dt="2025-09-08T13:07:11.513" v="792" actId="20577"/>
+        <pc:sldMkLst>
+          <pc:docMk/>
+          <pc:sldMk cId="634982452" sldId="256"/>
+        </pc:sldMkLst>
+        <pc:spChg chg="mod">
+          <ac:chgData name="Yoshiharu Hamaguchi" userId="470e288704938fe9" providerId="LiveId" clId="{70332866-803F-45E9-A120-6101FBB807E0}" dt="2025-09-08T13:07:11.513" v="792" actId="20577"/>
+          <ac:spMkLst>
+            <pc:docMk/>
+            <pc:sldMk cId="634982452" sldId="256"/>
+            <ac:spMk id="2" creationId="{3F0D190A-A8DB-32F1-0D56-13F6D381B778}"/>
+          </ac:spMkLst>
+        </pc:spChg>
+      </pc:sldChg>
+      <pc:sldChg chg="addSp delSp modSp mod">
+        <pc:chgData name="Yoshiharu Hamaguchi" userId="470e288704938fe9" providerId="LiveId" clId="{70332866-803F-45E9-A120-6101FBB807E0}" dt="2025-09-08T13:46:04.454" v="2267" actId="20577"/>
+        <pc:sldMkLst>
+          <pc:docMk/>
+          <pc:sldMk cId="4019972730" sldId="262"/>
+        </pc:sldMkLst>
+        <pc:spChg chg="mod">
+          <ac:chgData name="Yoshiharu Hamaguchi" userId="470e288704938fe9" providerId="LiveId" clId="{70332866-803F-45E9-A120-6101FBB807E0}" dt="2025-09-08T13:45:37.751" v="2219" actId="20577"/>
+          <ac:spMkLst>
+            <pc:docMk/>
+            <pc:sldMk cId="4019972730" sldId="262"/>
+            <ac:spMk id="3" creationId="{37025C41-8921-578C-16F8-6B5CF0A93AE0}"/>
+          </ac:spMkLst>
+        </pc:spChg>
+        <pc:spChg chg="mod">
+          <ac:chgData name="Yoshiharu Hamaguchi" userId="470e288704938fe9" providerId="LiveId" clId="{70332866-803F-45E9-A120-6101FBB807E0}" dt="2025-09-08T13:46:04.454" v="2267" actId="20577"/>
+          <ac:spMkLst>
+            <pc:docMk/>
+            <pc:sldMk cId="4019972730" sldId="262"/>
+            <ac:spMk id="6" creationId="{34FF66A4-5BCB-CEE2-BCDE-1006905C1554}"/>
+          </ac:spMkLst>
+        </pc:spChg>
+        <pc:picChg chg="add mod">
+          <ac:chgData name="Yoshiharu Hamaguchi" userId="470e288704938fe9" providerId="LiveId" clId="{70332866-803F-45E9-A120-6101FBB807E0}" dt="2025-09-08T13:36:11.455" v="1273" actId="1076"/>
+          <ac:picMkLst>
+            <pc:docMk/>
+            <pc:sldMk cId="4019972730" sldId="262"/>
+            <ac:picMk id="4" creationId="{0422C9E0-B473-A1C3-1880-8559272F9630}"/>
+          </ac:picMkLst>
+        </pc:picChg>
+      </pc:sldChg>
+      <pc:sldChg chg="modSp mod">
+        <pc:chgData name="Yoshiharu Hamaguchi" userId="470e288704938fe9" providerId="LiveId" clId="{70332866-803F-45E9-A120-6101FBB807E0}" dt="2025-09-08T13:29:27.377" v="1054" actId="20577"/>
+        <pc:sldMkLst>
+          <pc:docMk/>
+          <pc:sldMk cId="3365730422" sldId="264"/>
+        </pc:sldMkLst>
+        <pc:spChg chg="mod">
+          <ac:chgData name="Yoshiharu Hamaguchi" userId="470e288704938fe9" providerId="LiveId" clId="{70332866-803F-45E9-A120-6101FBB807E0}" dt="2025-09-08T13:29:27.377" v="1054" actId="20577"/>
+          <ac:spMkLst>
+            <pc:docMk/>
+            <pc:sldMk cId="3365730422" sldId="264"/>
+            <ac:spMk id="3" creationId="{37025C41-8921-578C-16F8-6B5CF0A93AE0}"/>
+          </ac:spMkLst>
+        </pc:spChg>
+      </pc:sldChg>
+      <pc:sldChg chg="del">
+        <pc:chgData name="Yoshiharu Hamaguchi" userId="470e288704938fe9" providerId="LiveId" clId="{70332866-803F-45E9-A120-6101FBB807E0}" dt="2025-09-08T13:17:08.942" v="912" actId="47"/>
+        <pc:sldMkLst>
+          <pc:docMk/>
+          <pc:sldMk cId="3544669301" sldId="266"/>
+        </pc:sldMkLst>
+      </pc:sldChg>
+      <pc:sldChg chg="addSp delSp modSp mod">
+        <pc:chgData name="Yoshiharu Hamaguchi" userId="470e288704938fe9" providerId="LiveId" clId="{70332866-803F-45E9-A120-6101FBB807E0}" dt="2025-09-08T13:26:51.657" v="1028" actId="255"/>
+        <pc:sldMkLst>
+          <pc:docMk/>
+          <pc:sldMk cId="2142688305" sldId="269"/>
+        </pc:sldMkLst>
+      </pc:sldChg>
+      <pc:sldChg chg="del">
+        <pc:chgData name="Yoshiharu Hamaguchi" userId="470e288704938fe9" providerId="LiveId" clId="{70332866-803F-45E9-A120-6101FBB807E0}" dt="2025-09-08T13:16:59.642" v="911" actId="47"/>
+        <pc:sldMkLst>
+          <pc:docMk/>
+          <pc:sldMk cId="2038620804" sldId="270"/>
+        </pc:sldMkLst>
+      </pc:sldChg>
+      <pc:sldChg chg="addSp delSp modSp add mod">
+        <pc:chgData name="Yoshiharu Hamaguchi" userId="470e288704938fe9" providerId="LiveId" clId="{70332866-803F-45E9-A120-6101FBB807E0}" dt="2025-09-08T13:43:04.555" v="2015" actId="20577"/>
+        <pc:sldMkLst>
+          <pc:docMk/>
+          <pc:sldMk cId="1473502982" sldId="271"/>
+        </pc:sldMkLst>
+        <pc:spChg chg="add mod">
+          <ac:chgData name="Yoshiharu Hamaguchi" userId="470e288704938fe9" providerId="LiveId" clId="{70332866-803F-45E9-A120-6101FBB807E0}" dt="2025-09-08T13:43:04.555" v="2015" actId="20577"/>
+          <ac:spMkLst>
+            <pc:docMk/>
+            <pc:sldMk cId="1473502982" sldId="271"/>
+            <ac:spMk id="12" creationId="{E944DFBB-A102-FEAA-D487-BCBEE3A4BD63}"/>
+          </ac:spMkLst>
+        </pc:spChg>
+      </pc:sldChg>
+      <pc:sldChg chg="addSp modSp add mod">
+        <pc:chgData name="Yoshiharu Hamaguchi" userId="470e288704938fe9" providerId="LiveId" clId="{70332866-803F-45E9-A120-6101FBB807E0}" dt="2025-09-08T13:44:13.842" v="2060" actId="1076"/>
+        <pc:sldMkLst>
+          <pc:docMk/>
+          <pc:sldMk cId="3129097109" sldId="272"/>
+        </pc:sldMkLst>
+        <pc:spChg chg="mod">
+          <ac:chgData name="Yoshiharu Hamaguchi" userId="470e288704938fe9" providerId="LiveId" clId="{70332866-803F-45E9-A120-6101FBB807E0}" dt="2025-09-08T13:42:49.731" v="2008" actId="20577"/>
+          <ac:spMkLst>
+            <pc:docMk/>
+            <pc:sldMk cId="3129097109" sldId="272"/>
+            <ac:spMk id="2" creationId="{9C784ACA-9376-15C6-DD93-68B5D582FADA}"/>
+          </ac:spMkLst>
+        </pc:spChg>
+        <pc:spChg chg="mod">
+          <ac:chgData name="Yoshiharu Hamaguchi" userId="470e288704938fe9" providerId="LiveId" clId="{70332866-803F-45E9-A120-6101FBB807E0}" dt="2025-09-08T13:43:46.783" v="2055" actId="6549"/>
+          <ac:spMkLst>
+            <pc:docMk/>
+            <pc:sldMk cId="3129097109" sldId="272"/>
+            <ac:spMk id="12" creationId="{E944DFBB-A102-FEAA-D487-BCBEE3A4BD63}"/>
+          </ac:spMkLst>
+        </pc:spChg>
+        <pc:picChg chg="add mod">
+          <ac:chgData name="Yoshiharu Hamaguchi" userId="470e288704938fe9" providerId="LiveId" clId="{70332866-803F-45E9-A120-6101FBB807E0}" dt="2025-09-08T13:44:13.842" v="2060" actId="1076"/>
+          <ac:picMkLst>
+            <pc:docMk/>
+            <pc:sldMk cId="3129097109" sldId="272"/>
+            <ac:picMk id="4" creationId="{0AB3AA65-1C33-C627-0C02-C48972C6F5CD}"/>
+          </ac:picMkLst>
+        </pc:picChg>
+      </pc:sldChg>
+      <pc:sldChg chg="addSp modSp add mod">
+        <pc:chgData name="Yoshiharu Hamaguchi" userId="470e288704938fe9" providerId="LiveId" clId="{70332866-803F-45E9-A120-6101FBB807E0}" dt="2025-09-08T14:48:55.172" v="3078" actId="1076"/>
+        <pc:sldMkLst>
+          <pc:docMk/>
+          <pc:sldMk cId="3565779213" sldId="273"/>
+        </pc:sldMkLst>
+        <pc:spChg chg="mod">
+          <ac:chgData name="Yoshiharu Hamaguchi" userId="470e288704938fe9" providerId="LiveId" clId="{70332866-803F-45E9-A120-6101FBB807E0}" dt="2025-09-08T14:35:56.978" v="2617" actId="20577"/>
+          <ac:spMkLst>
+            <pc:docMk/>
+            <pc:sldMk cId="3565779213" sldId="273"/>
+            <ac:spMk id="2" creationId="{9C784ACA-9376-15C6-DD93-68B5D582FADA}"/>
+          </ac:spMkLst>
+        </pc:spChg>
+        <pc:spChg chg="mod">
+          <ac:chgData name="Yoshiharu Hamaguchi" userId="470e288704938fe9" providerId="LiveId" clId="{70332866-803F-45E9-A120-6101FBB807E0}" dt="2025-09-08T14:48:52.592" v="3077" actId="1076"/>
+          <ac:spMkLst>
+            <pc:docMk/>
+            <pc:sldMk cId="3565779213" sldId="273"/>
+            <ac:spMk id="12" creationId="{E944DFBB-A102-FEAA-D487-BCBEE3A4BD63}"/>
+          </ac:spMkLst>
+        </pc:spChg>
+        <pc:graphicFrameChg chg="add mod modGraphic">
+          <ac:chgData name="Yoshiharu Hamaguchi" userId="470e288704938fe9" providerId="LiveId" clId="{70332866-803F-45E9-A120-6101FBB807E0}" dt="2025-09-08T14:48:55.172" v="3078" actId="1076"/>
+          <ac:graphicFrameMkLst>
+            <pc:docMk/>
+            <pc:sldMk cId="3565779213" sldId="273"/>
+            <ac:graphicFrameMk id="3" creationId="{BB32AE2C-65C1-A108-C432-F1FF4EBEB96B}"/>
+          </ac:graphicFrameMkLst>
+        </pc:graphicFrameChg>
+      </pc:sldChg>
+      <pc:sldChg chg="addSp modSp add mod">
+        <pc:chgData name="Yoshiharu Hamaguchi" userId="470e288704938fe9" providerId="LiveId" clId="{70332866-803F-45E9-A120-6101FBB807E0}" dt="2025-09-08T14:56:44.792" v="4266"/>
+        <pc:sldMkLst>
+          <pc:docMk/>
+          <pc:sldMk cId="2114986016" sldId="274"/>
+        </pc:sldMkLst>
+        <pc:spChg chg="mod">
+          <ac:chgData name="Yoshiharu Hamaguchi" userId="470e288704938fe9" providerId="LiveId" clId="{70332866-803F-45E9-A120-6101FBB807E0}" dt="2025-09-08T14:06:42.942" v="2396" actId="20577"/>
+          <ac:spMkLst>
+            <pc:docMk/>
+            <pc:sldMk cId="2114986016" sldId="274"/>
+            <ac:spMk id="2" creationId="{9C784ACA-9376-15C6-DD93-68B5D582FADA}"/>
+          </ac:spMkLst>
+        </pc:spChg>
+        <pc:spChg chg="mod">
+          <ac:chgData name="Yoshiharu Hamaguchi" userId="470e288704938fe9" providerId="LiveId" clId="{70332866-803F-45E9-A120-6101FBB807E0}" dt="2025-09-08T14:56:44.792" v="4266"/>
+          <ac:spMkLst>
+            <pc:docMk/>
+            <pc:sldMk cId="2114986016" sldId="274"/>
+            <ac:spMk id="12" creationId="{E944DFBB-A102-FEAA-D487-BCBEE3A4BD63}"/>
+          </ac:spMkLst>
+        </pc:spChg>
+        <pc:picChg chg="add mod">
+          <ac:chgData name="Yoshiharu Hamaguchi" userId="470e288704938fe9" providerId="LiveId" clId="{70332866-803F-45E9-A120-6101FBB807E0}" dt="2025-09-08T14:30:40.720" v="2574" actId="1036"/>
+          <ac:picMkLst>
+            <pc:docMk/>
+            <pc:sldMk cId="2114986016" sldId="274"/>
+            <ac:picMk id="3" creationId="{7E3945CA-055B-F40B-6033-6F28B417F04D}"/>
+          </ac:picMkLst>
+        </pc:picChg>
+      </pc:sldChg>
+      <pc:sldChg chg="delSp modSp add mod">
+        <pc:chgData name="Yoshiharu Hamaguchi" userId="470e288704938fe9" providerId="LiveId" clId="{70332866-803F-45E9-A120-6101FBB807E0}" dt="2025-09-08T14:54:43.380" v="4101" actId="20577"/>
+        <pc:sldMkLst>
+          <pc:docMk/>
+          <pc:sldMk cId="914960372" sldId="275"/>
+        </pc:sldMkLst>
+        <pc:spChg chg="mod">
+          <ac:chgData name="Yoshiharu Hamaguchi" userId="470e288704938fe9" providerId="LiveId" clId="{70332866-803F-45E9-A120-6101FBB807E0}" dt="2025-09-08T14:54:43.380" v="4101" actId="20577"/>
+          <ac:spMkLst>
+            <pc:docMk/>
+            <pc:sldMk cId="914960372" sldId="275"/>
+            <ac:spMk id="2" creationId="{9C784ACA-9376-15C6-DD93-68B5D582FADA}"/>
+          </ac:spMkLst>
+        </pc:spChg>
+        <pc:spChg chg="mod">
+          <ac:chgData name="Yoshiharu Hamaguchi" userId="470e288704938fe9" providerId="LiveId" clId="{70332866-803F-45E9-A120-6101FBB807E0}" dt="2025-09-08T14:52:48.660" v="3756" actId="20577"/>
+          <ac:spMkLst>
+            <pc:docMk/>
+            <pc:sldMk cId="914960372" sldId="275"/>
+            <ac:spMk id="12" creationId="{E944DFBB-A102-FEAA-D487-BCBEE3A4BD63}"/>
+          </ac:spMkLst>
+        </pc:spChg>
+      </pc:sldChg>
+      <pc:sldChg chg="addSp delSp modSp add del mod">
+        <pc:chgData name="Yoshiharu Hamaguchi" userId="470e288704938fe9" providerId="LiveId" clId="{70332866-803F-45E9-A120-6101FBB807E0}" dt="2025-09-08T14:29:29.771" v="2540" actId="47"/>
+        <pc:sldMkLst>
+          <pc:docMk/>
+          <pc:sldMk cId="3512689603" sldId="275"/>
+        </pc:sldMkLst>
+      </pc:sldChg>
+      <pc:sldChg chg="modSp add mod">
+        <pc:chgData name="Yoshiharu Hamaguchi" userId="470e288704938fe9" providerId="LiveId" clId="{70332866-803F-45E9-A120-6101FBB807E0}" dt="2025-09-08T14:54:17.815" v="4085" actId="20577"/>
+        <pc:sldMkLst>
+          <pc:docMk/>
+          <pc:sldMk cId="11239393" sldId="276"/>
+        </pc:sldMkLst>
+        <pc:spChg chg="mod">
+          <ac:chgData name="Yoshiharu Hamaguchi" userId="470e288704938fe9" providerId="LiveId" clId="{70332866-803F-45E9-A120-6101FBB807E0}" dt="2025-09-08T14:53:27.147" v="3866" actId="20577"/>
+          <ac:spMkLst>
+            <pc:docMk/>
+            <pc:sldMk cId="11239393" sldId="276"/>
+            <ac:spMk id="2" creationId="{9C784ACA-9376-15C6-DD93-68B5D582FADA}"/>
+          </ac:spMkLst>
+        </pc:spChg>
+        <pc:spChg chg="mod">
+          <ac:chgData name="Yoshiharu Hamaguchi" userId="470e288704938fe9" providerId="LiveId" clId="{70332866-803F-45E9-A120-6101FBB807E0}" dt="2025-09-08T14:54:17.815" v="4085" actId="20577"/>
+          <ac:spMkLst>
+            <pc:docMk/>
+            <pc:sldMk cId="11239393" sldId="276"/>
+            <ac:spMk id="12" creationId="{E944DFBB-A102-FEAA-D487-BCBEE3A4BD63}"/>
+          </ac:spMkLst>
+        </pc:spChg>
+      </pc:sldChg>
+      <pc:sldChg chg="modSp add mod">
+        <pc:chgData name="Yoshiharu Hamaguchi" userId="470e288704938fe9" providerId="LiveId" clId="{70332866-803F-45E9-A120-6101FBB807E0}" dt="2025-09-08T14:55:11.230" v="4201" actId="20577"/>
+        <pc:sldMkLst>
+          <pc:docMk/>
+          <pc:sldMk cId="2816348142" sldId="277"/>
+        </pc:sldMkLst>
+        <pc:spChg chg="mod">
+          <ac:chgData name="Yoshiharu Hamaguchi" userId="470e288704938fe9" providerId="LiveId" clId="{70332866-803F-45E9-A120-6101FBB807E0}" dt="2025-09-08T14:54:58.097" v="4136" actId="20577"/>
+          <ac:spMkLst>
+            <pc:docMk/>
+            <pc:sldMk cId="2816348142" sldId="277"/>
+            <ac:spMk id="2" creationId="{9C784ACA-9376-15C6-DD93-68B5D582FADA}"/>
+          </ac:spMkLst>
+        </pc:spChg>
+        <pc:spChg chg="mod">
+          <ac:chgData name="Yoshiharu Hamaguchi" userId="470e288704938fe9" providerId="LiveId" clId="{70332866-803F-45E9-A120-6101FBB807E0}" dt="2025-09-08T14:55:11.230" v="4201" actId="20577"/>
+          <ac:spMkLst>
+            <pc:docMk/>
+            <pc:sldMk cId="2816348142" sldId="277"/>
+            <ac:spMk id="12" creationId="{E944DFBB-A102-FEAA-D487-BCBEE3A4BD63}"/>
+          </ac:spMkLst>
+        </pc:spChg>
+      </pc:sldChg>
+    </pc:docChg>
+  </pc:docChgLst>
+  <pc:docChgLst>
     <pc:chgData name="Yoshiharu Hamaguchi" userId="470e288704938fe9" providerId="LiveId" clId="{7FF04D8D-0E5C-4D85-91C7-38CEECAF421B}"/>
     <pc:docChg chg="delSld modSld">
       <pc:chgData name="Yoshiharu Hamaguchi" userId="470e288704938fe9" providerId="LiveId" clId="{7FF04D8D-0E5C-4D85-91C7-38CEECAF421B}" dt="2024-08-30T00:39:52.340" v="69" actId="47"/>
@@ -1755,281 +2030,6 @@
           <pc:docMk/>
           <pc:sldMk cId="1265752602" sldId="261"/>
         </pc:sldMkLst>
-      </pc:sldChg>
-    </pc:docChg>
-  </pc:docChgLst>
-  <pc:docChgLst>
-    <pc:chgData name="Yoshiharu Hamaguchi" userId="470e288704938fe9" providerId="LiveId" clId="{70332866-803F-45E9-A120-6101FBB807E0}"/>
-    <pc:docChg chg="undo custSel addSld delSld modSld">
-      <pc:chgData name="Yoshiharu Hamaguchi" userId="470e288704938fe9" providerId="LiveId" clId="{70332866-803F-45E9-A120-6101FBB807E0}" dt="2025-09-08T14:56:44.792" v="4266"/>
-      <pc:docMkLst>
-        <pc:docMk/>
-      </pc:docMkLst>
-      <pc:sldChg chg="modSp mod">
-        <pc:chgData name="Yoshiharu Hamaguchi" userId="470e288704938fe9" providerId="LiveId" clId="{70332866-803F-45E9-A120-6101FBB807E0}" dt="2025-09-08T13:07:11.513" v="792" actId="20577"/>
-        <pc:sldMkLst>
-          <pc:docMk/>
-          <pc:sldMk cId="634982452" sldId="256"/>
-        </pc:sldMkLst>
-        <pc:spChg chg="mod">
-          <ac:chgData name="Yoshiharu Hamaguchi" userId="470e288704938fe9" providerId="LiveId" clId="{70332866-803F-45E9-A120-6101FBB807E0}" dt="2025-09-08T13:07:11.513" v="792" actId="20577"/>
-          <ac:spMkLst>
-            <pc:docMk/>
-            <pc:sldMk cId="634982452" sldId="256"/>
-            <ac:spMk id="2" creationId="{3F0D190A-A8DB-32F1-0D56-13F6D381B778}"/>
-          </ac:spMkLst>
-        </pc:spChg>
-      </pc:sldChg>
-      <pc:sldChg chg="addSp delSp modSp mod">
-        <pc:chgData name="Yoshiharu Hamaguchi" userId="470e288704938fe9" providerId="LiveId" clId="{70332866-803F-45E9-A120-6101FBB807E0}" dt="2025-09-08T13:46:04.454" v="2267" actId="20577"/>
-        <pc:sldMkLst>
-          <pc:docMk/>
-          <pc:sldMk cId="4019972730" sldId="262"/>
-        </pc:sldMkLst>
-        <pc:spChg chg="mod">
-          <ac:chgData name="Yoshiharu Hamaguchi" userId="470e288704938fe9" providerId="LiveId" clId="{70332866-803F-45E9-A120-6101FBB807E0}" dt="2025-09-08T13:45:37.751" v="2219" actId="20577"/>
-          <ac:spMkLst>
-            <pc:docMk/>
-            <pc:sldMk cId="4019972730" sldId="262"/>
-            <ac:spMk id="3" creationId="{37025C41-8921-578C-16F8-6B5CF0A93AE0}"/>
-          </ac:spMkLst>
-        </pc:spChg>
-        <pc:spChg chg="mod">
-          <ac:chgData name="Yoshiharu Hamaguchi" userId="470e288704938fe9" providerId="LiveId" clId="{70332866-803F-45E9-A120-6101FBB807E0}" dt="2025-09-08T13:46:04.454" v="2267" actId="20577"/>
-          <ac:spMkLst>
-            <pc:docMk/>
-            <pc:sldMk cId="4019972730" sldId="262"/>
-            <ac:spMk id="6" creationId="{34FF66A4-5BCB-CEE2-BCDE-1006905C1554}"/>
-          </ac:spMkLst>
-        </pc:spChg>
-        <pc:picChg chg="add mod">
-          <ac:chgData name="Yoshiharu Hamaguchi" userId="470e288704938fe9" providerId="LiveId" clId="{70332866-803F-45E9-A120-6101FBB807E0}" dt="2025-09-08T13:36:11.455" v="1273" actId="1076"/>
-          <ac:picMkLst>
-            <pc:docMk/>
-            <pc:sldMk cId="4019972730" sldId="262"/>
-            <ac:picMk id="4" creationId="{0422C9E0-B473-A1C3-1880-8559272F9630}"/>
-          </ac:picMkLst>
-        </pc:picChg>
-      </pc:sldChg>
-      <pc:sldChg chg="modSp mod">
-        <pc:chgData name="Yoshiharu Hamaguchi" userId="470e288704938fe9" providerId="LiveId" clId="{70332866-803F-45E9-A120-6101FBB807E0}" dt="2025-09-08T13:29:27.377" v="1054" actId="20577"/>
-        <pc:sldMkLst>
-          <pc:docMk/>
-          <pc:sldMk cId="3365730422" sldId="264"/>
-        </pc:sldMkLst>
-        <pc:spChg chg="mod">
-          <ac:chgData name="Yoshiharu Hamaguchi" userId="470e288704938fe9" providerId="LiveId" clId="{70332866-803F-45E9-A120-6101FBB807E0}" dt="2025-09-08T13:29:27.377" v="1054" actId="20577"/>
-          <ac:spMkLst>
-            <pc:docMk/>
-            <pc:sldMk cId="3365730422" sldId="264"/>
-            <ac:spMk id="3" creationId="{37025C41-8921-578C-16F8-6B5CF0A93AE0}"/>
-          </ac:spMkLst>
-        </pc:spChg>
-      </pc:sldChg>
-      <pc:sldChg chg="del">
-        <pc:chgData name="Yoshiharu Hamaguchi" userId="470e288704938fe9" providerId="LiveId" clId="{70332866-803F-45E9-A120-6101FBB807E0}" dt="2025-09-08T13:17:08.942" v="912" actId="47"/>
-        <pc:sldMkLst>
-          <pc:docMk/>
-          <pc:sldMk cId="3544669301" sldId="266"/>
-        </pc:sldMkLst>
-      </pc:sldChg>
-      <pc:sldChg chg="addSp delSp modSp mod">
-        <pc:chgData name="Yoshiharu Hamaguchi" userId="470e288704938fe9" providerId="LiveId" clId="{70332866-803F-45E9-A120-6101FBB807E0}" dt="2025-09-08T13:26:51.657" v="1028" actId="255"/>
-        <pc:sldMkLst>
-          <pc:docMk/>
-          <pc:sldMk cId="2142688305" sldId="269"/>
-        </pc:sldMkLst>
-      </pc:sldChg>
-      <pc:sldChg chg="del">
-        <pc:chgData name="Yoshiharu Hamaguchi" userId="470e288704938fe9" providerId="LiveId" clId="{70332866-803F-45E9-A120-6101FBB807E0}" dt="2025-09-08T13:16:59.642" v="911" actId="47"/>
-        <pc:sldMkLst>
-          <pc:docMk/>
-          <pc:sldMk cId="2038620804" sldId="270"/>
-        </pc:sldMkLst>
-      </pc:sldChg>
-      <pc:sldChg chg="addSp delSp modSp add mod">
-        <pc:chgData name="Yoshiharu Hamaguchi" userId="470e288704938fe9" providerId="LiveId" clId="{70332866-803F-45E9-A120-6101FBB807E0}" dt="2025-09-08T13:43:04.555" v="2015" actId="20577"/>
-        <pc:sldMkLst>
-          <pc:docMk/>
-          <pc:sldMk cId="1473502982" sldId="271"/>
-        </pc:sldMkLst>
-        <pc:spChg chg="add mod">
-          <ac:chgData name="Yoshiharu Hamaguchi" userId="470e288704938fe9" providerId="LiveId" clId="{70332866-803F-45E9-A120-6101FBB807E0}" dt="2025-09-08T13:43:04.555" v="2015" actId="20577"/>
-          <ac:spMkLst>
-            <pc:docMk/>
-            <pc:sldMk cId="1473502982" sldId="271"/>
-            <ac:spMk id="12" creationId="{E944DFBB-A102-FEAA-D487-BCBEE3A4BD63}"/>
-          </ac:spMkLst>
-        </pc:spChg>
-      </pc:sldChg>
-      <pc:sldChg chg="addSp modSp add mod">
-        <pc:chgData name="Yoshiharu Hamaguchi" userId="470e288704938fe9" providerId="LiveId" clId="{70332866-803F-45E9-A120-6101FBB807E0}" dt="2025-09-08T13:44:13.842" v="2060" actId="1076"/>
-        <pc:sldMkLst>
-          <pc:docMk/>
-          <pc:sldMk cId="3129097109" sldId="272"/>
-        </pc:sldMkLst>
-        <pc:spChg chg="mod">
-          <ac:chgData name="Yoshiharu Hamaguchi" userId="470e288704938fe9" providerId="LiveId" clId="{70332866-803F-45E9-A120-6101FBB807E0}" dt="2025-09-08T13:42:49.731" v="2008" actId="20577"/>
-          <ac:spMkLst>
-            <pc:docMk/>
-            <pc:sldMk cId="3129097109" sldId="272"/>
-            <ac:spMk id="2" creationId="{9C784ACA-9376-15C6-DD93-68B5D582FADA}"/>
-          </ac:spMkLst>
-        </pc:spChg>
-        <pc:spChg chg="mod">
-          <ac:chgData name="Yoshiharu Hamaguchi" userId="470e288704938fe9" providerId="LiveId" clId="{70332866-803F-45E9-A120-6101FBB807E0}" dt="2025-09-08T13:43:46.783" v="2055" actId="6549"/>
-          <ac:spMkLst>
-            <pc:docMk/>
-            <pc:sldMk cId="3129097109" sldId="272"/>
-            <ac:spMk id="12" creationId="{E944DFBB-A102-FEAA-D487-BCBEE3A4BD63}"/>
-          </ac:spMkLst>
-        </pc:spChg>
-        <pc:picChg chg="add mod">
-          <ac:chgData name="Yoshiharu Hamaguchi" userId="470e288704938fe9" providerId="LiveId" clId="{70332866-803F-45E9-A120-6101FBB807E0}" dt="2025-09-08T13:44:13.842" v="2060" actId="1076"/>
-          <ac:picMkLst>
-            <pc:docMk/>
-            <pc:sldMk cId="3129097109" sldId="272"/>
-            <ac:picMk id="4" creationId="{0AB3AA65-1C33-C627-0C02-C48972C6F5CD}"/>
-          </ac:picMkLst>
-        </pc:picChg>
-      </pc:sldChg>
-      <pc:sldChg chg="addSp modSp add mod">
-        <pc:chgData name="Yoshiharu Hamaguchi" userId="470e288704938fe9" providerId="LiveId" clId="{70332866-803F-45E9-A120-6101FBB807E0}" dt="2025-09-08T14:48:55.172" v="3078" actId="1076"/>
-        <pc:sldMkLst>
-          <pc:docMk/>
-          <pc:sldMk cId="3565779213" sldId="273"/>
-        </pc:sldMkLst>
-        <pc:spChg chg="mod">
-          <ac:chgData name="Yoshiharu Hamaguchi" userId="470e288704938fe9" providerId="LiveId" clId="{70332866-803F-45E9-A120-6101FBB807E0}" dt="2025-09-08T14:35:56.978" v="2617" actId="20577"/>
-          <ac:spMkLst>
-            <pc:docMk/>
-            <pc:sldMk cId="3565779213" sldId="273"/>
-            <ac:spMk id="2" creationId="{9C784ACA-9376-15C6-DD93-68B5D582FADA}"/>
-          </ac:spMkLst>
-        </pc:spChg>
-        <pc:spChg chg="mod">
-          <ac:chgData name="Yoshiharu Hamaguchi" userId="470e288704938fe9" providerId="LiveId" clId="{70332866-803F-45E9-A120-6101FBB807E0}" dt="2025-09-08T14:48:52.592" v="3077" actId="1076"/>
-          <ac:spMkLst>
-            <pc:docMk/>
-            <pc:sldMk cId="3565779213" sldId="273"/>
-            <ac:spMk id="12" creationId="{E944DFBB-A102-FEAA-D487-BCBEE3A4BD63}"/>
-          </ac:spMkLst>
-        </pc:spChg>
-        <pc:graphicFrameChg chg="add mod modGraphic">
-          <ac:chgData name="Yoshiharu Hamaguchi" userId="470e288704938fe9" providerId="LiveId" clId="{70332866-803F-45E9-A120-6101FBB807E0}" dt="2025-09-08T14:48:55.172" v="3078" actId="1076"/>
-          <ac:graphicFrameMkLst>
-            <pc:docMk/>
-            <pc:sldMk cId="3565779213" sldId="273"/>
-            <ac:graphicFrameMk id="3" creationId="{BB32AE2C-65C1-A108-C432-F1FF4EBEB96B}"/>
-          </ac:graphicFrameMkLst>
-        </pc:graphicFrameChg>
-      </pc:sldChg>
-      <pc:sldChg chg="addSp modSp add mod">
-        <pc:chgData name="Yoshiharu Hamaguchi" userId="470e288704938fe9" providerId="LiveId" clId="{70332866-803F-45E9-A120-6101FBB807E0}" dt="2025-09-08T14:56:44.792" v="4266"/>
-        <pc:sldMkLst>
-          <pc:docMk/>
-          <pc:sldMk cId="2114986016" sldId="274"/>
-        </pc:sldMkLst>
-        <pc:spChg chg="mod">
-          <ac:chgData name="Yoshiharu Hamaguchi" userId="470e288704938fe9" providerId="LiveId" clId="{70332866-803F-45E9-A120-6101FBB807E0}" dt="2025-09-08T14:06:42.942" v="2396" actId="20577"/>
-          <ac:spMkLst>
-            <pc:docMk/>
-            <pc:sldMk cId="2114986016" sldId="274"/>
-            <ac:spMk id="2" creationId="{9C784ACA-9376-15C6-DD93-68B5D582FADA}"/>
-          </ac:spMkLst>
-        </pc:spChg>
-        <pc:spChg chg="mod">
-          <ac:chgData name="Yoshiharu Hamaguchi" userId="470e288704938fe9" providerId="LiveId" clId="{70332866-803F-45E9-A120-6101FBB807E0}" dt="2025-09-08T14:56:44.792" v="4266"/>
-          <ac:spMkLst>
-            <pc:docMk/>
-            <pc:sldMk cId="2114986016" sldId="274"/>
-            <ac:spMk id="12" creationId="{E944DFBB-A102-FEAA-D487-BCBEE3A4BD63}"/>
-          </ac:spMkLst>
-        </pc:spChg>
-        <pc:picChg chg="add mod">
-          <ac:chgData name="Yoshiharu Hamaguchi" userId="470e288704938fe9" providerId="LiveId" clId="{70332866-803F-45E9-A120-6101FBB807E0}" dt="2025-09-08T14:30:40.720" v="2574" actId="1036"/>
-          <ac:picMkLst>
-            <pc:docMk/>
-            <pc:sldMk cId="2114986016" sldId="274"/>
-            <ac:picMk id="3" creationId="{7E3945CA-055B-F40B-6033-6F28B417F04D}"/>
-          </ac:picMkLst>
-        </pc:picChg>
-      </pc:sldChg>
-      <pc:sldChg chg="delSp modSp add mod">
-        <pc:chgData name="Yoshiharu Hamaguchi" userId="470e288704938fe9" providerId="LiveId" clId="{70332866-803F-45E9-A120-6101FBB807E0}" dt="2025-09-08T14:54:43.380" v="4101" actId="20577"/>
-        <pc:sldMkLst>
-          <pc:docMk/>
-          <pc:sldMk cId="914960372" sldId="275"/>
-        </pc:sldMkLst>
-        <pc:spChg chg="mod">
-          <ac:chgData name="Yoshiharu Hamaguchi" userId="470e288704938fe9" providerId="LiveId" clId="{70332866-803F-45E9-A120-6101FBB807E0}" dt="2025-09-08T14:54:43.380" v="4101" actId="20577"/>
-          <ac:spMkLst>
-            <pc:docMk/>
-            <pc:sldMk cId="914960372" sldId="275"/>
-            <ac:spMk id="2" creationId="{9C784ACA-9376-15C6-DD93-68B5D582FADA}"/>
-          </ac:spMkLst>
-        </pc:spChg>
-        <pc:spChg chg="mod">
-          <ac:chgData name="Yoshiharu Hamaguchi" userId="470e288704938fe9" providerId="LiveId" clId="{70332866-803F-45E9-A120-6101FBB807E0}" dt="2025-09-08T14:52:48.660" v="3756" actId="20577"/>
-          <ac:spMkLst>
-            <pc:docMk/>
-            <pc:sldMk cId="914960372" sldId="275"/>
-            <ac:spMk id="12" creationId="{E944DFBB-A102-FEAA-D487-BCBEE3A4BD63}"/>
-          </ac:spMkLst>
-        </pc:spChg>
-      </pc:sldChg>
-      <pc:sldChg chg="addSp delSp modSp add del mod">
-        <pc:chgData name="Yoshiharu Hamaguchi" userId="470e288704938fe9" providerId="LiveId" clId="{70332866-803F-45E9-A120-6101FBB807E0}" dt="2025-09-08T14:29:29.771" v="2540" actId="47"/>
-        <pc:sldMkLst>
-          <pc:docMk/>
-          <pc:sldMk cId="3512689603" sldId="275"/>
-        </pc:sldMkLst>
-      </pc:sldChg>
-      <pc:sldChg chg="modSp add mod">
-        <pc:chgData name="Yoshiharu Hamaguchi" userId="470e288704938fe9" providerId="LiveId" clId="{70332866-803F-45E9-A120-6101FBB807E0}" dt="2025-09-08T14:54:17.815" v="4085" actId="20577"/>
-        <pc:sldMkLst>
-          <pc:docMk/>
-          <pc:sldMk cId="11239393" sldId="276"/>
-        </pc:sldMkLst>
-        <pc:spChg chg="mod">
-          <ac:chgData name="Yoshiharu Hamaguchi" userId="470e288704938fe9" providerId="LiveId" clId="{70332866-803F-45E9-A120-6101FBB807E0}" dt="2025-09-08T14:53:27.147" v="3866" actId="20577"/>
-          <ac:spMkLst>
-            <pc:docMk/>
-            <pc:sldMk cId="11239393" sldId="276"/>
-            <ac:spMk id="2" creationId="{9C784ACA-9376-15C6-DD93-68B5D582FADA}"/>
-          </ac:spMkLst>
-        </pc:spChg>
-        <pc:spChg chg="mod">
-          <ac:chgData name="Yoshiharu Hamaguchi" userId="470e288704938fe9" providerId="LiveId" clId="{70332866-803F-45E9-A120-6101FBB807E0}" dt="2025-09-08T14:54:17.815" v="4085" actId="20577"/>
-          <ac:spMkLst>
-            <pc:docMk/>
-            <pc:sldMk cId="11239393" sldId="276"/>
-            <ac:spMk id="12" creationId="{E944DFBB-A102-FEAA-D487-BCBEE3A4BD63}"/>
-          </ac:spMkLst>
-        </pc:spChg>
-      </pc:sldChg>
-      <pc:sldChg chg="modSp add mod">
-        <pc:chgData name="Yoshiharu Hamaguchi" userId="470e288704938fe9" providerId="LiveId" clId="{70332866-803F-45E9-A120-6101FBB807E0}" dt="2025-09-08T14:55:11.230" v="4201" actId="20577"/>
-        <pc:sldMkLst>
-          <pc:docMk/>
-          <pc:sldMk cId="2816348142" sldId="277"/>
-        </pc:sldMkLst>
-        <pc:spChg chg="mod">
-          <ac:chgData name="Yoshiharu Hamaguchi" userId="470e288704938fe9" providerId="LiveId" clId="{70332866-803F-45E9-A120-6101FBB807E0}" dt="2025-09-08T14:54:58.097" v="4136" actId="20577"/>
-          <ac:spMkLst>
-            <pc:docMk/>
-            <pc:sldMk cId="2816348142" sldId="277"/>
-            <ac:spMk id="2" creationId="{9C784ACA-9376-15C6-DD93-68B5D582FADA}"/>
-          </ac:spMkLst>
-        </pc:spChg>
-        <pc:spChg chg="mod">
-          <ac:chgData name="Yoshiharu Hamaguchi" userId="470e288704938fe9" providerId="LiveId" clId="{70332866-803F-45E9-A120-6101FBB807E0}" dt="2025-09-08T14:55:11.230" v="4201" actId="20577"/>
-          <ac:spMkLst>
-            <pc:docMk/>
-            <pc:sldMk cId="2816348142" sldId="277"/>
-            <ac:spMk id="12" creationId="{E944DFBB-A102-FEAA-D487-BCBEE3A4BD63}"/>
-          </ac:spMkLst>
-        </pc:spChg>
       </pc:sldChg>
     </pc:docChg>
   </pc:docChgLst>
@@ -2213,7 +2213,7 @@
           <a:p>
             <a:fld id="{AE223B80-E8D9-435B-A6E4-76A811B061CC}" type="datetimeFigureOut">
               <a:rPr kumimoji="1" lang="ja-JP" altLang="en-US" smtClean="0"/>
-              <a:t>2025/12/7</a:t>
+              <a:t>2025/12/8</a:t>
             </a:fld>
             <a:endParaRPr kumimoji="1" lang="ja-JP" altLang="en-US"/>
           </a:p>
@@ -2743,7 +2743,7 @@
           <a:p>
             <a:fld id="{9627246E-3903-4E01-B28D-BFF5567D65C3}" type="datetimeFigureOut">
               <a:rPr kumimoji="1" lang="ja-JP" altLang="en-US" smtClean="0"/>
-              <a:t>2025/12/7</a:t>
+              <a:t>2025/12/8</a:t>
             </a:fld>
             <a:endParaRPr kumimoji="1" lang="ja-JP" altLang="en-US"/>
           </a:p>
@@ -2973,7 +2973,7 @@
           <a:p>
             <a:fld id="{9627246E-3903-4E01-B28D-BFF5567D65C3}" type="datetimeFigureOut">
               <a:rPr kumimoji="1" lang="ja-JP" altLang="en-US" smtClean="0"/>
-              <a:t>2025/12/7</a:t>
+              <a:t>2025/12/8</a:t>
             </a:fld>
             <a:endParaRPr kumimoji="1" lang="ja-JP" altLang="en-US"/>
           </a:p>
@@ -3213,7 +3213,7 @@
           <a:p>
             <a:fld id="{9627246E-3903-4E01-B28D-BFF5567D65C3}" type="datetimeFigureOut">
               <a:rPr kumimoji="1" lang="ja-JP" altLang="en-US" smtClean="0"/>
-              <a:t>2025/12/7</a:t>
+              <a:t>2025/12/8</a:t>
             </a:fld>
             <a:endParaRPr kumimoji="1" lang="ja-JP" altLang="en-US"/>
           </a:p>
@@ -3443,7 +3443,7 @@
           <a:p>
             <a:fld id="{9627246E-3903-4E01-B28D-BFF5567D65C3}" type="datetimeFigureOut">
               <a:rPr kumimoji="1" lang="ja-JP" altLang="en-US" smtClean="0"/>
-              <a:t>2025/12/7</a:t>
+              <a:t>2025/12/8</a:t>
             </a:fld>
             <a:endParaRPr kumimoji="1" lang="ja-JP" altLang="en-US"/>
           </a:p>
@@ -3718,7 +3718,7 @@
           <a:p>
             <a:fld id="{9627246E-3903-4E01-B28D-BFF5567D65C3}" type="datetimeFigureOut">
               <a:rPr kumimoji="1" lang="ja-JP" altLang="en-US" smtClean="0"/>
-              <a:t>2025/12/7</a:t>
+              <a:t>2025/12/8</a:t>
             </a:fld>
             <a:endParaRPr kumimoji="1" lang="ja-JP" altLang="en-US"/>
           </a:p>
@@ -4047,7 +4047,7 @@
           <a:p>
             <a:fld id="{9627246E-3903-4E01-B28D-BFF5567D65C3}" type="datetimeFigureOut">
               <a:rPr kumimoji="1" lang="ja-JP" altLang="en-US" smtClean="0"/>
-              <a:t>2025/12/7</a:t>
+              <a:t>2025/12/8</a:t>
             </a:fld>
             <a:endParaRPr kumimoji="1" lang="ja-JP" altLang="en-US"/>
           </a:p>
@@ -4523,7 +4523,7 @@
           <a:p>
             <a:fld id="{9627246E-3903-4E01-B28D-BFF5567D65C3}" type="datetimeFigureOut">
               <a:rPr kumimoji="1" lang="ja-JP" altLang="en-US" smtClean="0"/>
-              <a:t>2025/12/7</a:t>
+              <a:t>2025/12/8</a:t>
             </a:fld>
             <a:endParaRPr kumimoji="1" lang="ja-JP" altLang="en-US"/>
           </a:p>
@@ -4664,7 +4664,7 @@
           <a:p>
             <a:fld id="{9627246E-3903-4E01-B28D-BFF5567D65C3}" type="datetimeFigureOut">
               <a:rPr kumimoji="1" lang="ja-JP" altLang="en-US" smtClean="0"/>
-              <a:t>2025/12/7</a:t>
+              <a:t>2025/12/8</a:t>
             </a:fld>
             <a:endParaRPr kumimoji="1" lang="ja-JP" altLang="en-US"/>
           </a:p>
@@ -4777,7 +4777,7 @@
           <a:p>
             <a:fld id="{9627246E-3903-4E01-B28D-BFF5567D65C3}" type="datetimeFigureOut">
               <a:rPr kumimoji="1" lang="ja-JP" altLang="en-US" smtClean="0"/>
-              <a:t>2025/12/7</a:t>
+              <a:t>2025/12/8</a:t>
             </a:fld>
             <a:endParaRPr kumimoji="1" lang="ja-JP" altLang="en-US"/>
           </a:p>
@@ -5120,7 +5120,7 @@
           <a:p>
             <a:fld id="{9627246E-3903-4E01-B28D-BFF5567D65C3}" type="datetimeFigureOut">
               <a:rPr kumimoji="1" lang="ja-JP" altLang="en-US" smtClean="0"/>
-              <a:t>2025/12/7</a:t>
+              <a:t>2025/12/8</a:t>
             </a:fld>
             <a:endParaRPr kumimoji="1" lang="ja-JP" altLang="en-US"/>
           </a:p>
@@ -5408,7 +5408,7 @@
           <a:p>
             <a:fld id="{9627246E-3903-4E01-B28D-BFF5567D65C3}" type="datetimeFigureOut">
               <a:rPr kumimoji="1" lang="ja-JP" altLang="en-US" smtClean="0"/>
-              <a:t>2025/12/7</a:t>
+              <a:t>2025/12/8</a:t>
             </a:fld>
             <a:endParaRPr kumimoji="1" lang="ja-JP" altLang="en-US"/>
           </a:p>
@@ -5681,7 +5681,7 @@
           <a:p>
             <a:fld id="{9627246E-3903-4E01-B28D-BFF5567D65C3}" type="datetimeFigureOut">
               <a:rPr kumimoji="1" lang="ja-JP" altLang="en-US" smtClean="0"/>
-              <a:t>2025/12/7</a:t>
+              <a:t>2025/12/8</a:t>
             </a:fld>
             <a:endParaRPr kumimoji="1" lang="ja-JP" altLang="en-US"/>
           </a:p>
@@ -9083,8 +9083,8 @@
           <a:lstStyle/>
           <a:p>
             <a:r>
-              <a:rPr lang="en-US" altLang="ja-JP" dirty="0"/>
-              <a:t>Protocol Buffers</a:t>
+              <a:rPr lang="ja-JP" altLang="en-US" dirty="0"/>
+              <a:t>整理すると</a:t>
             </a:r>
             <a:endParaRPr kumimoji="1" lang="ja-JP" altLang="en-US" dirty="0"/>
           </a:p>
@@ -9118,705 +9118,6 @@
           </a:bodyPr>
           <a:lstStyle/>
           <a:p>
-            <a:r>
-              <a:rPr lang="en-US" altLang="ja-JP" dirty="0"/>
-              <a:t>JSON</a:t>
-            </a:r>
-            <a:r>
-              <a:rPr lang="ja-JP" altLang="en-US" dirty="0"/>
-              <a:t>と比べてバイナリ形式のため、データサイズが小さく高速です</a:t>
-            </a:r>
-            <a:endParaRPr lang="en-US" altLang="ja-JP" dirty="0"/>
-          </a:p>
-          <a:p>
-            <a:endParaRPr lang="ja-JP" altLang="en-US" dirty="0"/>
-          </a:p>
-          <a:p>
-            <a:r>
-              <a:rPr lang="ja-JP" altLang="en-US" dirty="0"/>
-              <a:t>スキーマ定義から各言語のコードを自動生成できます</a:t>
-            </a:r>
-            <a:br>
-              <a:rPr lang="ja-JP" altLang="en-US" dirty="0"/>
-            </a:br>
-            <a:endParaRPr lang="ja-JP" altLang="en-US" dirty="0"/>
-          </a:p>
-          <a:p>
-            <a:pPr marL="0" indent="0">
-              <a:buNone/>
-            </a:pPr>
-            <a:endParaRPr lang="en-US" altLang="ja-JP" sz="2400" dirty="0"/>
-          </a:p>
-          <a:p>
-            <a:pPr marL="0" indent="0">
-              <a:buNone/>
-            </a:pPr>
-            <a:endParaRPr lang="en-US" altLang="ja-JP" sz="2400" dirty="0"/>
-          </a:p>
-          <a:p>
-            <a:pPr marL="0" indent="0">
-              <a:buNone/>
-            </a:pPr>
-            <a:endParaRPr lang="en-US" altLang="ja-JP" sz="2400" dirty="0"/>
-          </a:p>
-          <a:p>
-            <a:pPr>
-              <a:buFontTx/>
-              <a:buChar char="-"/>
-            </a:pPr>
-            <a:endParaRPr lang="en-US" altLang="ja-JP" sz="2400" dirty="0"/>
-          </a:p>
-          <a:p>
-            <a:pPr>
-              <a:buFontTx/>
-              <a:buChar char="-"/>
-            </a:pPr>
-            <a:endParaRPr lang="en-US" altLang="ja-JP" sz="2400" dirty="0"/>
-          </a:p>
-          <a:p>
-            <a:pPr>
-              <a:buFontTx/>
-              <a:buChar char="-"/>
-            </a:pPr>
-            <a:endParaRPr lang="en-US" altLang="ja-JP" sz="2400" dirty="0"/>
-          </a:p>
-        </p:txBody>
-      </p:sp>
-    </p:spTree>
-    <p:extLst>
-      <p:ext uri="{BB962C8B-B14F-4D97-AF65-F5344CB8AC3E}">
-        <p14:creationId xmlns:p14="http://schemas.microsoft.com/office/powerpoint/2010/main" val="3129097109"/>
-      </p:ext>
-    </p:extLst>
-  </p:cSld>
-  <p:clrMapOvr>
-    <a:masterClrMapping/>
-  </p:clrMapOvr>
-</p:sld>
-</file>
-
-<file path=ppt/slides/slide5.xml><?xml version="1.0" encoding="utf-8"?>
-<p:sld xmlns:a="http://schemas.openxmlformats.org/drawingml/2006/main" xmlns:r="http://schemas.openxmlformats.org/officeDocument/2006/relationships" xmlns:p="http://schemas.openxmlformats.org/presentationml/2006/main">
-  <p:cSld>
-    <p:spTree>
-      <p:nvGrpSpPr>
-        <p:cNvPr id="1" name=""/>
-        <p:cNvGrpSpPr/>
-        <p:nvPr/>
-      </p:nvGrpSpPr>
-      <p:grpSpPr>
-        <a:xfrm>
-          <a:off x="0" y="0"/>
-          <a:ext cx="0" cy="0"/>
-          <a:chOff x="0" y="0"/>
-          <a:chExt cx="0" cy="0"/>
-        </a:xfrm>
-      </p:grpSpPr>
-      <p:sp>
-        <p:nvSpPr>
-          <p:cNvPr id="2" name="タイトル 1">
-            <a:extLst>
-              <a:ext uri="{FF2B5EF4-FFF2-40B4-BE49-F238E27FC236}">
-                <a16:creationId xmlns:a16="http://schemas.microsoft.com/office/drawing/2014/main" id="{9C784ACA-9376-15C6-DD93-68B5D582FADA}"/>
-              </a:ext>
-            </a:extLst>
-          </p:cNvPr>
-          <p:cNvSpPr>
-            <a:spLocks noGrp="1"/>
-          </p:cNvSpPr>
-          <p:nvPr>
-            <p:ph type="title"/>
-          </p:nvPr>
-        </p:nvSpPr>
-        <p:spPr>
-          <a:xfrm>
-            <a:off x="838200" y="365126"/>
-            <a:ext cx="10515600" cy="891020"/>
-          </a:xfrm>
-        </p:spPr>
-        <p:txBody>
-          <a:bodyPr>
-            <a:normAutofit/>
-          </a:bodyPr>
-          <a:lstStyle/>
-          <a:p>
-            <a:r>
-              <a:rPr lang="en-US" altLang="ja-JP" dirty="0"/>
-              <a:t>Protocol Buffers</a:t>
-            </a:r>
-            <a:endParaRPr kumimoji="1" lang="ja-JP" altLang="en-US" dirty="0"/>
-          </a:p>
-        </p:txBody>
-      </p:sp>
-      <p:sp>
-        <p:nvSpPr>
-          <p:cNvPr id="12" name="コンテンツ プレースホルダー 11">
-            <a:extLst>
-              <a:ext uri="{FF2B5EF4-FFF2-40B4-BE49-F238E27FC236}">
-                <a16:creationId xmlns:a16="http://schemas.microsoft.com/office/drawing/2014/main" id="{E944DFBB-A102-FEAA-D487-BCBEE3A4BD63}"/>
-              </a:ext>
-            </a:extLst>
-          </p:cNvPr>
-          <p:cNvSpPr>
-            <a:spLocks noGrp="1"/>
-          </p:cNvSpPr>
-          <p:nvPr>
-            <p:ph idx="1"/>
-          </p:nvPr>
-        </p:nvSpPr>
-        <p:spPr>
-          <a:xfrm>
-            <a:off x="838200" y="1401417"/>
-            <a:ext cx="10515600" cy="4775546"/>
-          </a:xfrm>
-        </p:spPr>
-        <p:txBody>
-          <a:bodyPr>
-            <a:normAutofit/>
-          </a:bodyPr>
-          <a:lstStyle/>
-          <a:p>
-            <a:r>
-              <a:rPr lang="en-US" altLang="ja-JP" dirty="0"/>
-              <a:t>JSON</a:t>
-            </a:r>
-            <a:r>
-              <a:rPr lang="ja-JP" altLang="en-US" dirty="0"/>
-              <a:t>と比べてバイナリ形式のため、データサイズが小さく高速です</a:t>
-            </a:r>
-            <a:endParaRPr lang="en-US" altLang="ja-JP" dirty="0"/>
-          </a:p>
-          <a:p>
-            <a:endParaRPr lang="en-US" altLang="ja-JP" dirty="0"/>
-          </a:p>
-          <a:p>
-            <a:r>
-              <a:rPr lang="en-US" altLang="ja-JP" dirty="0" err="1"/>
-              <a:t>gRPC</a:t>
-            </a:r>
-            <a:r>
-              <a:rPr lang="ja-JP" altLang="en-US" dirty="0"/>
-              <a:t>と</a:t>
-            </a:r>
-            <a:r>
-              <a:rPr lang="en-US" altLang="ja-JP" dirty="0"/>
-              <a:t>Protocol Buffers</a:t>
-            </a:r>
-            <a:r>
-              <a:rPr lang="ja-JP" altLang="en-US" dirty="0"/>
-              <a:t>をインストール</a:t>
-            </a:r>
-            <a:endParaRPr lang="en-US" altLang="ja-JP" dirty="0"/>
-          </a:p>
-          <a:p>
-            <a:endParaRPr lang="en-US" altLang="ja-JP" dirty="0"/>
-          </a:p>
-          <a:p>
-            <a:pPr marL="0" indent="0">
-              <a:buNone/>
-            </a:pPr>
-            <a:endParaRPr lang="en-US" altLang="ja-JP" sz="2400" dirty="0"/>
-          </a:p>
-          <a:p>
-            <a:pPr marL="0" indent="0">
-              <a:buNone/>
-            </a:pPr>
-            <a:endParaRPr lang="en-US" altLang="ja-JP" sz="2400" dirty="0"/>
-          </a:p>
-          <a:p>
-            <a:pPr marL="0" indent="0">
-              <a:buNone/>
-            </a:pPr>
-            <a:endParaRPr lang="en-US" altLang="ja-JP" sz="2400" dirty="0"/>
-          </a:p>
-          <a:p>
-            <a:pPr>
-              <a:buFontTx/>
-              <a:buChar char="-"/>
-            </a:pPr>
-            <a:endParaRPr lang="en-US" altLang="ja-JP" sz="2400" dirty="0"/>
-          </a:p>
-          <a:p>
-            <a:pPr>
-              <a:buFontTx/>
-              <a:buChar char="-"/>
-            </a:pPr>
-            <a:endParaRPr lang="en-US" altLang="ja-JP" sz="2400" dirty="0"/>
-          </a:p>
-          <a:p>
-            <a:pPr>
-              <a:buFontTx/>
-              <a:buChar char="-"/>
-            </a:pPr>
-            <a:endParaRPr lang="en-US" altLang="ja-JP" sz="2400" dirty="0"/>
-          </a:p>
-        </p:txBody>
-      </p:sp>
-      <p:pic>
-        <p:nvPicPr>
-          <p:cNvPr id="4" name="図 3">
-            <a:extLst>
-              <a:ext uri="{FF2B5EF4-FFF2-40B4-BE49-F238E27FC236}">
-                <a16:creationId xmlns:a16="http://schemas.microsoft.com/office/drawing/2014/main" id="{A27EC174-2CDA-B99D-713F-6907C7F831AD}"/>
-              </a:ext>
-            </a:extLst>
-          </p:cNvPr>
-          <p:cNvPicPr>
-            <a:picLocks noChangeAspect="1"/>
-          </p:cNvPicPr>
-          <p:nvPr/>
-        </p:nvPicPr>
-        <p:blipFill>
-          <a:blip r:embed="rId2"/>
-          <a:stretch>
-            <a:fillRect/>
-          </a:stretch>
-        </p:blipFill>
-        <p:spPr>
-          <a:xfrm>
-            <a:off x="6321170" y="2274503"/>
-            <a:ext cx="4658375" cy="3029373"/>
-          </a:xfrm>
-          <a:prstGeom prst="rect">
-            <a:avLst/>
-          </a:prstGeom>
-        </p:spPr>
-      </p:pic>
-    </p:spTree>
-    <p:extLst>
-      <p:ext uri="{BB962C8B-B14F-4D97-AF65-F5344CB8AC3E}">
-        <p14:creationId xmlns:p14="http://schemas.microsoft.com/office/powerpoint/2010/main" val="259682668"/>
-      </p:ext>
-    </p:extLst>
-  </p:cSld>
-  <p:clrMapOvr>
-    <a:masterClrMapping/>
-  </p:clrMapOvr>
-</p:sld>
-</file>
-
-<file path=ppt/slides/slide6.xml><?xml version="1.0" encoding="utf-8"?>
-<p:sld xmlns:a="http://schemas.openxmlformats.org/drawingml/2006/main" xmlns:r="http://schemas.openxmlformats.org/officeDocument/2006/relationships" xmlns:p="http://schemas.openxmlformats.org/presentationml/2006/main">
-  <p:cSld>
-    <p:spTree>
-      <p:nvGrpSpPr>
-        <p:cNvPr id="1" name=""/>
-        <p:cNvGrpSpPr/>
-        <p:nvPr/>
-      </p:nvGrpSpPr>
-      <p:grpSpPr>
-        <a:xfrm>
-          <a:off x="0" y="0"/>
-          <a:ext cx="0" cy="0"/>
-          <a:chOff x="0" y="0"/>
-          <a:chExt cx="0" cy="0"/>
-        </a:xfrm>
-      </p:grpSpPr>
-      <p:sp>
-        <p:nvSpPr>
-          <p:cNvPr id="2" name="タイトル 1">
-            <a:extLst>
-              <a:ext uri="{FF2B5EF4-FFF2-40B4-BE49-F238E27FC236}">
-                <a16:creationId xmlns:a16="http://schemas.microsoft.com/office/drawing/2014/main" id="{9C784ACA-9376-15C6-DD93-68B5D582FADA}"/>
-              </a:ext>
-            </a:extLst>
-          </p:cNvPr>
-          <p:cNvSpPr>
-            <a:spLocks noGrp="1"/>
-          </p:cNvSpPr>
-          <p:nvPr>
-            <p:ph type="title"/>
-          </p:nvPr>
-        </p:nvSpPr>
-        <p:spPr>
-          <a:xfrm>
-            <a:off x="838200" y="365126"/>
-            <a:ext cx="10515600" cy="891020"/>
-          </a:xfrm>
-        </p:spPr>
-        <p:txBody>
-          <a:bodyPr>
-            <a:normAutofit/>
-          </a:bodyPr>
-          <a:lstStyle/>
-          <a:p>
-            <a:r>
-              <a:rPr kumimoji="1" lang="en-US" altLang="ja-JP" dirty="0"/>
-              <a:t>HTTP/2</a:t>
-            </a:r>
-            <a:r>
-              <a:rPr kumimoji="1" lang="ja-JP" altLang="en-US" dirty="0"/>
-              <a:t>ベース</a:t>
-            </a:r>
-          </a:p>
-        </p:txBody>
-      </p:sp>
-      <p:sp>
-        <p:nvSpPr>
-          <p:cNvPr id="12" name="コンテンツ プレースホルダー 11">
-            <a:extLst>
-              <a:ext uri="{FF2B5EF4-FFF2-40B4-BE49-F238E27FC236}">
-                <a16:creationId xmlns:a16="http://schemas.microsoft.com/office/drawing/2014/main" id="{E944DFBB-A102-FEAA-D487-BCBEE3A4BD63}"/>
-              </a:ext>
-            </a:extLst>
-          </p:cNvPr>
-          <p:cNvSpPr>
-            <a:spLocks noGrp="1"/>
-          </p:cNvSpPr>
-          <p:nvPr>
-            <p:ph idx="1"/>
-          </p:nvPr>
-        </p:nvSpPr>
-        <p:spPr>
-          <a:xfrm>
-            <a:off x="838200" y="1401417"/>
-            <a:ext cx="10515600" cy="4775546"/>
-          </a:xfrm>
-        </p:spPr>
-        <p:txBody>
-          <a:bodyPr>
-            <a:normAutofit/>
-          </a:bodyPr>
-          <a:lstStyle/>
-          <a:p>
-            <a:r>
-              <a:rPr lang="en-US" altLang="ja-JP" dirty="0"/>
-              <a:t>HTTP/2</a:t>
-            </a:r>
-            <a:r>
-              <a:rPr lang="ja-JP" altLang="en-US" dirty="0"/>
-              <a:t>の多重化機能により</a:t>
-            </a:r>
-            <a:r>
-              <a:rPr lang="en-US" altLang="ja-JP" dirty="0"/>
-              <a:t>1</a:t>
-            </a:r>
-            <a:r>
-              <a:rPr lang="ja-JP" altLang="en-US" dirty="0"/>
-              <a:t>つの</a:t>
-            </a:r>
-            <a:r>
-              <a:rPr lang="en-US" altLang="ja-JP" dirty="0"/>
-              <a:t>TCP</a:t>
-            </a:r>
-            <a:r>
-              <a:rPr lang="ja-JP" altLang="en-US" dirty="0"/>
-              <a:t>接続で複数のリクエストを並列処理できます</a:t>
-            </a:r>
-            <a:endParaRPr lang="en-US" altLang="ja-JP" dirty="0"/>
-          </a:p>
-          <a:p>
-            <a:endParaRPr lang="ja-JP" altLang="en-US" dirty="0"/>
-          </a:p>
-          <a:p>
-            <a:r>
-              <a:rPr lang="ja-JP" altLang="en-US" dirty="0"/>
-              <a:t>ヘッダー圧縮によりオーバーヘッドが削減されます</a:t>
-            </a:r>
-            <a:endParaRPr lang="en-US" altLang="ja-JP" dirty="0"/>
-          </a:p>
-          <a:p>
-            <a:endParaRPr lang="ja-JP" altLang="en-US" dirty="0"/>
-          </a:p>
-          <a:p>
-            <a:r>
-              <a:rPr lang="ja-JP" altLang="en-US" dirty="0"/>
-              <a:t>双方向ストリーミングをサポートしています</a:t>
-            </a:r>
-          </a:p>
-          <a:p>
-            <a:pPr marL="0" indent="0">
-              <a:buNone/>
-            </a:pPr>
-            <a:br>
-              <a:rPr lang="ja-JP" altLang="en-US" dirty="0"/>
-            </a:br>
-            <a:endParaRPr lang="ja-JP" altLang="en-US" dirty="0"/>
-          </a:p>
-          <a:p>
-            <a:pPr marL="0" indent="0">
-              <a:buNone/>
-            </a:pPr>
-            <a:endParaRPr lang="en-US" altLang="ja-JP" sz="2400" dirty="0"/>
-          </a:p>
-          <a:p>
-            <a:pPr marL="0" indent="0">
-              <a:buNone/>
-            </a:pPr>
-            <a:endParaRPr lang="en-US" altLang="ja-JP" sz="2400" dirty="0"/>
-          </a:p>
-          <a:p>
-            <a:pPr marL="0" indent="0">
-              <a:buNone/>
-            </a:pPr>
-            <a:endParaRPr lang="en-US" altLang="ja-JP" sz="2400" dirty="0"/>
-          </a:p>
-          <a:p>
-            <a:pPr>
-              <a:buFontTx/>
-              <a:buChar char="-"/>
-            </a:pPr>
-            <a:endParaRPr lang="en-US" altLang="ja-JP" sz="2400" dirty="0"/>
-          </a:p>
-          <a:p>
-            <a:pPr>
-              <a:buFontTx/>
-              <a:buChar char="-"/>
-            </a:pPr>
-            <a:endParaRPr lang="en-US" altLang="ja-JP" sz="2400" dirty="0"/>
-          </a:p>
-          <a:p>
-            <a:pPr>
-              <a:buFontTx/>
-              <a:buChar char="-"/>
-            </a:pPr>
-            <a:endParaRPr lang="en-US" altLang="ja-JP" sz="2400" dirty="0"/>
-          </a:p>
-        </p:txBody>
-      </p:sp>
-    </p:spTree>
-    <p:extLst>
-      <p:ext uri="{BB962C8B-B14F-4D97-AF65-F5344CB8AC3E}">
-        <p14:creationId xmlns:p14="http://schemas.microsoft.com/office/powerpoint/2010/main" val="4154140404"/>
-      </p:ext>
-    </p:extLst>
-  </p:cSld>
-  <p:clrMapOvr>
-    <a:masterClrMapping/>
-  </p:clrMapOvr>
-</p:sld>
-</file>
-
-<file path=ppt/slides/slide7.xml><?xml version="1.0" encoding="utf-8"?>
-<p:sld xmlns:a="http://schemas.openxmlformats.org/drawingml/2006/main" xmlns:r="http://schemas.openxmlformats.org/officeDocument/2006/relationships" xmlns:p="http://schemas.openxmlformats.org/presentationml/2006/main">
-  <p:cSld>
-    <p:spTree>
-      <p:nvGrpSpPr>
-        <p:cNvPr id="1" name=""/>
-        <p:cNvGrpSpPr/>
-        <p:nvPr/>
-      </p:nvGrpSpPr>
-      <p:grpSpPr>
-        <a:xfrm>
-          <a:off x="0" y="0"/>
-          <a:ext cx="0" cy="0"/>
-          <a:chOff x="0" y="0"/>
-          <a:chExt cx="0" cy="0"/>
-        </a:xfrm>
-      </p:grpSpPr>
-      <p:sp>
-        <p:nvSpPr>
-          <p:cNvPr id="2" name="タイトル 1">
-            <a:extLst>
-              <a:ext uri="{FF2B5EF4-FFF2-40B4-BE49-F238E27FC236}">
-                <a16:creationId xmlns:a16="http://schemas.microsoft.com/office/drawing/2014/main" id="{9C784ACA-9376-15C6-DD93-68B5D582FADA}"/>
-              </a:ext>
-            </a:extLst>
-          </p:cNvPr>
-          <p:cNvSpPr>
-            <a:spLocks noGrp="1"/>
-          </p:cNvSpPr>
-          <p:nvPr>
-            <p:ph type="title"/>
-          </p:nvPr>
-        </p:nvSpPr>
-        <p:spPr>
-          <a:xfrm>
-            <a:off x="838200" y="365126"/>
-            <a:ext cx="10515600" cy="891020"/>
-          </a:xfrm>
-        </p:spPr>
-        <p:txBody>
-          <a:bodyPr>
-            <a:normAutofit/>
-          </a:bodyPr>
-          <a:lstStyle/>
-          <a:p>
-            <a:r>
-              <a:rPr kumimoji="1" lang="ja-JP" altLang="en-US" dirty="0"/>
-              <a:t>多言語対応</a:t>
-            </a:r>
-          </a:p>
-        </p:txBody>
-      </p:sp>
-      <p:sp>
-        <p:nvSpPr>
-          <p:cNvPr id="12" name="コンテンツ プレースホルダー 11">
-            <a:extLst>
-              <a:ext uri="{FF2B5EF4-FFF2-40B4-BE49-F238E27FC236}">
-                <a16:creationId xmlns:a16="http://schemas.microsoft.com/office/drawing/2014/main" id="{E944DFBB-A102-FEAA-D487-BCBEE3A4BD63}"/>
-              </a:ext>
-            </a:extLst>
-          </p:cNvPr>
-          <p:cNvSpPr>
-            <a:spLocks noGrp="1"/>
-          </p:cNvSpPr>
-          <p:nvPr>
-            <p:ph idx="1"/>
-          </p:nvPr>
-        </p:nvSpPr>
-        <p:spPr>
-          <a:xfrm>
-            <a:off x="838200" y="1401417"/>
-            <a:ext cx="10515600" cy="4775546"/>
-          </a:xfrm>
-        </p:spPr>
-        <p:txBody>
-          <a:bodyPr>
-            <a:normAutofit/>
-          </a:bodyPr>
-          <a:lstStyle/>
-          <a:p>
-            <a:r>
-              <a:rPr lang="en-US" altLang="ja-JP" dirty="0"/>
-              <a:t>C, C++, Java, Python, Go, Rust, C#</a:t>
-            </a:r>
-            <a:r>
-              <a:rPr lang="ja-JP" altLang="en-US" dirty="0"/>
-              <a:t>など多くの言語をサポートしています。</a:t>
-            </a:r>
-          </a:p>
-          <a:p>
-            <a:br>
-              <a:rPr lang="ja-JP" altLang="en-US" dirty="0"/>
-            </a:br>
-            <a:endParaRPr lang="ja-JP" altLang="en-US" dirty="0"/>
-          </a:p>
-          <a:p>
-            <a:pPr marL="0" indent="0">
-              <a:buNone/>
-            </a:pPr>
-            <a:endParaRPr lang="en-US" altLang="ja-JP" sz="2400" dirty="0"/>
-          </a:p>
-          <a:p>
-            <a:pPr marL="0" indent="0">
-              <a:buNone/>
-            </a:pPr>
-            <a:endParaRPr lang="en-US" altLang="ja-JP" sz="2400" dirty="0"/>
-          </a:p>
-          <a:p>
-            <a:pPr marL="0" indent="0">
-              <a:buNone/>
-            </a:pPr>
-            <a:endParaRPr lang="en-US" altLang="ja-JP" sz="2400" dirty="0"/>
-          </a:p>
-          <a:p>
-            <a:pPr>
-              <a:buFontTx/>
-              <a:buChar char="-"/>
-            </a:pPr>
-            <a:endParaRPr lang="en-US" altLang="ja-JP" sz="2400" dirty="0"/>
-          </a:p>
-          <a:p>
-            <a:pPr>
-              <a:buFontTx/>
-              <a:buChar char="-"/>
-            </a:pPr>
-            <a:endParaRPr lang="en-US" altLang="ja-JP" sz="2400" dirty="0"/>
-          </a:p>
-          <a:p>
-            <a:pPr>
-              <a:buFontTx/>
-              <a:buChar char="-"/>
-            </a:pPr>
-            <a:endParaRPr lang="en-US" altLang="ja-JP" sz="2400" dirty="0"/>
-          </a:p>
-        </p:txBody>
-      </p:sp>
-    </p:spTree>
-    <p:extLst>
-      <p:ext uri="{BB962C8B-B14F-4D97-AF65-F5344CB8AC3E}">
-        <p14:creationId xmlns:p14="http://schemas.microsoft.com/office/powerpoint/2010/main" val="2314387547"/>
-      </p:ext>
-    </p:extLst>
-  </p:cSld>
-  <p:clrMapOvr>
-    <a:masterClrMapping/>
-  </p:clrMapOvr>
-</p:sld>
-</file>
-
-<file path=ppt/slides/slide8.xml><?xml version="1.0" encoding="utf-8"?>
-<p:sld xmlns:a="http://schemas.openxmlformats.org/drawingml/2006/main" xmlns:r="http://schemas.openxmlformats.org/officeDocument/2006/relationships" xmlns:p="http://schemas.openxmlformats.org/presentationml/2006/main">
-  <p:cSld>
-    <p:spTree>
-      <p:nvGrpSpPr>
-        <p:cNvPr id="1" name=""/>
-        <p:cNvGrpSpPr/>
-        <p:nvPr/>
-      </p:nvGrpSpPr>
-      <p:grpSpPr>
-        <a:xfrm>
-          <a:off x="0" y="0"/>
-          <a:ext cx="0" cy="0"/>
-          <a:chOff x="0" y="0"/>
-          <a:chExt cx="0" cy="0"/>
-        </a:xfrm>
-      </p:grpSpPr>
-      <p:sp>
-        <p:nvSpPr>
-          <p:cNvPr id="2" name="タイトル 1">
-            <a:extLst>
-              <a:ext uri="{FF2B5EF4-FFF2-40B4-BE49-F238E27FC236}">
-                <a16:creationId xmlns:a16="http://schemas.microsoft.com/office/drawing/2014/main" id="{9C784ACA-9376-15C6-DD93-68B5D582FADA}"/>
-              </a:ext>
-            </a:extLst>
-          </p:cNvPr>
-          <p:cNvSpPr>
-            <a:spLocks noGrp="1"/>
-          </p:cNvSpPr>
-          <p:nvPr>
-            <p:ph type="title"/>
-          </p:nvPr>
-        </p:nvSpPr>
-        <p:spPr>
-          <a:xfrm>
-            <a:off x="838200" y="365126"/>
-            <a:ext cx="10515600" cy="891020"/>
-          </a:xfrm>
-        </p:spPr>
-        <p:txBody>
-          <a:bodyPr>
-            <a:normAutofit/>
-          </a:bodyPr>
-          <a:lstStyle/>
-          <a:p>
-            <a:r>
-              <a:rPr lang="ja-JP" altLang="en-US" dirty="0"/>
-              <a:t>整理すると</a:t>
-            </a:r>
-            <a:endParaRPr kumimoji="1" lang="ja-JP" altLang="en-US" dirty="0"/>
-          </a:p>
-        </p:txBody>
-      </p:sp>
-      <p:sp>
-        <p:nvSpPr>
-          <p:cNvPr id="12" name="コンテンツ プレースホルダー 11">
-            <a:extLst>
-              <a:ext uri="{FF2B5EF4-FFF2-40B4-BE49-F238E27FC236}">
-                <a16:creationId xmlns:a16="http://schemas.microsoft.com/office/drawing/2014/main" id="{E944DFBB-A102-FEAA-D487-BCBEE3A4BD63}"/>
-              </a:ext>
-            </a:extLst>
-          </p:cNvPr>
-          <p:cNvSpPr>
-            <a:spLocks noGrp="1"/>
-          </p:cNvSpPr>
-          <p:nvPr>
-            <p:ph idx="1"/>
-          </p:nvPr>
-        </p:nvSpPr>
-        <p:spPr>
-          <a:xfrm>
-            <a:off x="838200" y="1401417"/>
-            <a:ext cx="10515600" cy="4775546"/>
-          </a:xfrm>
-        </p:spPr>
-        <p:txBody>
-          <a:bodyPr>
-            <a:normAutofit/>
-          </a:bodyPr>
-          <a:lstStyle/>
-          <a:p>
             <a:br>
               <a:rPr lang="ja-JP" altLang="en-US" dirty="0"/>
             </a:br>
@@ -9878,14 +9179,14 @@
           <p:nvPr>
             <p:extLst>
               <p:ext uri="{D42A27DB-BD31-4B8C-83A1-F6EECF244321}">
-                <p14:modId xmlns:p14="http://schemas.microsoft.com/office/powerpoint/2010/main" val="286467555"/>
+                <p14:modId xmlns:p14="http://schemas.microsoft.com/office/powerpoint/2010/main" val="667311172"/>
               </p:ext>
             </p:extLst>
           </p:nvPr>
         </p:nvGraphicFramePr>
         <p:xfrm>
           <a:off x="1098549" y="1581150"/>
-          <a:ext cx="10112376" cy="1478280"/>
+          <a:ext cx="10112376" cy="1747520"/>
         </p:xfrm>
         <a:graphic>
           <a:graphicData uri="http://schemas.openxmlformats.org/drawingml/2006/table">
@@ -10059,7 +9360,19 @@
                     <a:p>
                       <a:r>
                         <a:rPr kumimoji="1" lang="en-US" altLang="ja-JP" dirty="0"/>
-                        <a:t>RPC1: AIDL(ICP)※Android</a:t>
+                        <a:t>RPC1: </a:t>
+                      </a:r>
+                      <a:r>
+                        <a:rPr kumimoji="1" lang="ja-JP" altLang="en-US" dirty="0"/>
+                        <a:t>プロセス間</a:t>
+                      </a:r>
+                      <a:r>
+                        <a:rPr kumimoji="1" lang="en-US" altLang="ja-JP"/>
+                        <a:t>※AIDL</a:t>
+                      </a:r>
+                      <a:r>
+                        <a:rPr kumimoji="1" lang="en-US" altLang="ja-JP" dirty="0"/>
+                        <a:t>(ICP)※Android</a:t>
                       </a:r>
                       <a:endParaRPr kumimoji="1" lang="ja-JP" altLang="en-US" dirty="0"/>
                     </a:p>
@@ -10188,6 +9501,705 @@
     <p:extLst>
       <p:ext uri="{BB962C8B-B14F-4D97-AF65-F5344CB8AC3E}">
         <p14:creationId xmlns:p14="http://schemas.microsoft.com/office/powerpoint/2010/main" val="3315305235"/>
+      </p:ext>
+    </p:extLst>
+  </p:cSld>
+  <p:clrMapOvr>
+    <a:masterClrMapping/>
+  </p:clrMapOvr>
+</p:sld>
+</file>
+
+<file path=ppt/slides/slide5.xml><?xml version="1.0" encoding="utf-8"?>
+<p:sld xmlns:a="http://schemas.openxmlformats.org/drawingml/2006/main" xmlns:r="http://schemas.openxmlformats.org/officeDocument/2006/relationships" xmlns:p="http://schemas.openxmlformats.org/presentationml/2006/main">
+  <p:cSld>
+    <p:spTree>
+      <p:nvGrpSpPr>
+        <p:cNvPr id="1" name=""/>
+        <p:cNvGrpSpPr/>
+        <p:nvPr/>
+      </p:nvGrpSpPr>
+      <p:grpSpPr>
+        <a:xfrm>
+          <a:off x="0" y="0"/>
+          <a:ext cx="0" cy="0"/>
+          <a:chOff x="0" y="0"/>
+          <a:chExt cx="0" cy="0"/>
+        </a:xfrm>
+      </p:grpSpPr>
+      <p:sp>
+        <p:nvSpPr>
+          <p:cNvPr id="2" name="タイトル 1">
+            <a:extLst>
+              <a:ext uri="{FF2B5EF4-FFF2-40B4-BE49-F238E27FC236}">
+                <a16:creationId xmlns:a16="http://schemas.microsoft.com/office/drawing/2014/main" id="{9C784ACA-9376-15C6-DD93-68B5D582FADA}"/>
+              </a:ext>
+            </a:extLst>
+          </p:cNvPr>
+          <p:cNvSpPr>
+            <a:spLocks noGrp="1"/>
+          </p:cNvSpPr>
+          <p:nvPr>
+            <p:ph type="title"/>
+          </p:nvPr>
+        </p:nvSpPr>
+        <p:spPr>
+          <a:xfrm>
+            <a:off x="838200" y="365126"/>
+            <a:ext cx="10515600" cy="891020"/>
+          </a:xfrm>
+        </p:spPr>
+        <p:txBody>
+          <a:bodyPr>
+            <a:normAutofit/>
+          </a:bodyPr>
+          <a:lstStyle/>
+          <a:p>
+            <a:r>
+              <a:rPr lang="en-US" altLang="ja-JP" dirty="0"/>
+              <a:t>Protocol Buffers</a:t>
+            </a:r>
+            <a:endParaRPr kumimoji="1" lang="ja-JP" altLang="en-US" dirty="0"/>
+          </a:p>
+        </p:txBody>
+      </p:sp>
+      <p:sp>
+        <p:nvSpPr>
+          <p:cNvPr id="12" name="コンテンツ プレースホルダー 11">
+            <a:extLst>
+              <a:ext uri="{FF2B5EF4-FFF2-40B4-BE49-F238E27FC236}">
+                <a16:creationId xmlns:a16="http://schemas.microsoft.com/office/drawing/2014/main" id="{E944DFBB-A102-FEAA-D487-BCBEE3A4BD63}"/>
+              </a:ext>
+            </a:extLst>
+          </p:cNvPr>
+          <p:cNvSpPr>
+            <a:spLocks noGrp="1"/>
+          </p:cNvSpPr>
+          <p:nvPr>
+            <p:ph idx="1"/>
+          </p:nvPr>
+        </p:nvSpPr>
+        <p:spPr>
+          <a:xfrm>
+            <a:off x="838200" y="1401417"/>
+            <a:ext cx="10515600" cy="4775546"/>
+          </a:xfrm>
+        </p:spPr>
+        <p:txBody>
+          <a:bodyPr>
+            <a:normAutofit/>
+          </a:bodyPr>
+          <a:lstStyle/>
+          <a:p>
+            <a:r>
+              <a:rPr lang="en-US" altLang="ja-JP" dirty="0"/>
+              <a:t>JSON</a:t>
+            </a:r>
+            <a:r>
+              <a:rPr lang="ja-JP" altLang="en-US" dirty="0"/>
+              <a:t>と比べてバイナリ形式のため、データサイズが小さく高速です</a:t>
+            </a:r>
+            <a:endParaRPr lang="en-US" altLang="ja-JP" dirty="0"/>
+          </a:p>
+          <a:p>
+            <a:endParaRPr lang="ja-JP" altLang="en-US" dirty="0"/>
+          </a:p>
+          <a:p>
+            <a:r>
+              <a:rPr lang="ja-JP" altLang="en-US" dirty="0"/>
+              <a:t>スキーマ定義から各言語のコードを自動生成できます</a:t>
+            </a:r>
+            <a:br>
+              <a:rPr lang="ja-JP" altLang="en-US" dirty="0"/>
+            </a:br>
+            <a:endParaRPr lang="ja-JP" altLang="en-US" dirty="0"/>
+          </a:p>
+          <a:p>
+            <a:pPr marL="0" indent="0">
+              <a:buNone/>
+            </a:pPr>
+            <a:endParaRPr lang="en-US" altLang="ja-JP" sz="2400" dirty="0"/>
+          </a:p>
+          <a:p>
+            <a:pPr marL="0" indent="0">
+              <a:buNone/>
+            </a:pPr>
+            <a:endParaRPr lang="en-US" altLang="ja-JP" sz="2400" dirty="0"/>
+          </a:p>
+          <a:p>
+            <a:pPr marL="0" indent="0">
+              <a:buNone/>
+            </a:pPr>
+            <a:endParaRPr lang="en-US" altLang="ja-JP" sz="2400" dirty="0"/>
+          </a:p>
+          <a:p>
+            <a:pPr>
+              <a:buFontTx/>
+              <a:buChar char="-"/>
+            </a:pPr>
+            <a:endParaRPr lang="en-US" altLang="ja-JP" sz="2400" dirty="0"/>
+          </a:p>
+          <a:p>
+            <a:pPr>
+              <a:buFontTx/>
+              <a:buChar char="-"/>
+            </a:pPr>
+            <a:endParaRPr lang="en-US" altLang="ja-JP" sz="2400" dirty="0"/>
+          </a:p>
+          <a:p>
+            <a:pPr>
+              <a:buFontTx/>
+              <a:buChar char="-"/>
+            </a:pPr>
+            <a:endParaRPr lang="en-US" altLang="ja-JP" sz="2400" dirty="0"/>
+          </a:p>
+        </p:txBody>
+      </p:sp>
+    </p:spTree>
+    <p:extLst>
+      <p:ext uri="{BB962C8B-B14F-4D97-AF65-F5344CB8AC3E}">
+        <p14:creationId xmlns:p14="http://schemas.microsoft.com/office/powerpoint/2010/main" val="3129097109"/>
+      </p:ext>
+    </p:extLst>
+  </p:cSld>
+  <p:clrMapOvr>
+    <a:masterClrMapping/>
+  </p:clrMapOvr>
+</p:sld>
+</file>
+
+<file path=ppt/slides/slide6.xml><?xml version="1.0" encoding="utf-8"?>
+<p:sld xmlns:a="http://schemas.openxmlformats.org/drawingml/2006/main" xmlns:r="http://schemas.openxmlformats.org/officeDocument/2006/relationships" xmlns:p="http://schemas.openxmlformats.org/presentationml/2006/main">
+  <p:cSld>
+    <p:spTree>
+      <p:nvGrpSpPr>
+        <p:cNvPr id="1" name=""/>
+        <p:cNvGrpSpPr/>
+        <p:nvPr/>
+      </p:nvGrpSpPr>
+      <p:grpSpPr>
+        <a:xfrm>
+          <a:off x="0" y="0"/>
+          <a:ext cx="0" cy="0"/>
+          <a:chOff x="0" y="0"/>
+          <a:chExt cx="0" cy="0"/>
+        </a:xfrm>
+      </p:grpSpPr>
+      <p:sp>
+        <p:nvSpPr>
+          <p:cNvPr id="2" name="タイトル 1">
+            <a:extLst>
+              <a:ext uri="{FF2B5EF4-FFF2-40B4-BE49-F238E27FC236}">
+                <a16:creationId xmlns:a16="http://schemas.microsoft.com/office/drawing/2014/main" id="{9C784ACA-9376-15C6-DD93-68B5D582FADA}"/>
+              </a:ext>
+            </a:extLst>
+          </p:cNvPr>
+          <p:cNvSpPr>
+            <a:spLocks noGrp="1"/>
+          </p:cNvSpPr>
+          <p:nvPr>
+            <p:ph type="title"/>
+          </p:nvPr>
+        </p:nvSpPr>
+        <p:spPr>
+          <a:xfrm>
+            <a:off x="838200" y="365126"/>
+            <a:ext cx="10515600" cy="891020"/>
+          </a:xfrm>
+        </p:spPr>
+        <p:txBody>
+          <a:bodyPr>
+            <a:normAutofit/>
+          </a:bodyPr>
+          <a:lstStyle/>
+          <a:p>
+            <a:r>
+              <a:rPr lang="en-US" altLang="ja-JP" dirty="0"/>
+              <a:t>Protocol Buffers</a:t>
+            </a:r>
+            <a:endParaRPr kumimoji="1" lang="ja-JP" altLang="en-US" dirty="0"/>
+          </a:p>
+        </p:txBody>
+      </p:sp>
+      <p:sp>
+        <p:nvSpPr>
+          <p:cNvPr id="12" name="コンテンツ プレースホルダー 11">
+            <a:extLst>
+              <a:ext uri="{FF2B5EF4-FFF2-40B4-BE49-F238E27FC236}">
+                <a16:creationId xmlns:a16="http://schemas.microsoft.com/office/drawing/2014/main" id="{E944DFBB-A102-FEAA-D487-BCBEE3A4BD63}"/>
+              </a:ext>
+            </a:extLst>
+          </p:cNvPr>
+          <p:cNvSpPr>
+            <a:spLocks noGrp="1"/>
+          </p:cNvSpPr>
+          <p:nvPr>
+            <p:ph idx="1"/>
+          </p:nvPr>
+        </p:nvSpPr>
+        <p:spPr>
+          <a:xfrm>
+            <a:off x="838200" y="1401417"/>
+            <a:ext cx="10515600" cy="4775546"/>
+          </a:xfrm>
+        </p:spPr>
+        <p:txBody>
+          <a:bodyPr>
+            <a:normAutofit/>
+          </a:bodyPr>
+          <a:lstStyle/>
+          <a:p>
+            <a:r>
+              <a:rPr lang="en-US" altLang="ja-JP" dirty="0"/>
+              <a:t>JSON</a:t>
+            </a:r>
+            <a:r>
+              <a:rPr lang="ja-JP" altLang="en-US" dirty="0"/>
+              <a:t>と比べてバイナリ形式のため、データサイズが小さく高速です</a:t>
+            </a:r>
+            <a:endParaRPr lang="en-US" altLang="ja-JP" dirty="0"/>
+          </a:p>
+          <a:p>
+            <a:endParaRPr lang="en-US" altLang="ja-JP" dirty="0"/>
+          </a:p>
+          <a:p>
+            <a:r>
+              <a:rPr lang="en-US" altLang="ja-JP" dirty="0" err="1"/>
+              <a:t>gRPC</a:t>
+            </a:r>
+            <a:r>
+              <a:rPr lang="ja-JP" altLang="en-US" dirty="0"/>
+              <a:t>と</a:t>
+            </a:r>
+            <a:r>
+              <a:rPr lang="en-US" altLang="ja-JP" dirty="0"/>
+              <a:t>Protocol Buffers</a:t>
+            </a:r>
+            <a:r>
+              <a:rPr lang="ja-JP" altLang="en-US" dirty="0"/>
+              <a:t>をインストール</a:t>
+            </a:r>
+            <a:endParaRPr lang="en-US" altLang="ja-JP" dirty="0"/>
+          </a:p>
+          <a:p>
+            <a:endParaRPr lang="en-US" altLang="ja-JP" dirty="0"/>
+          </a:p>
+          <a:p>
+            <a:pPr marL="0" indent="0">
+              <a:buNone/>
+            </a:pPr>
+            <a:endParaRPr lang="en-US" altLang="ja-JP" sz="2400" dirty="0"/>
+          </a:p>
+          <a:p>
+            <a:pPr marL="0" indent="0">
+              <a:buNone/>
+            </a:pPr>
+            <a:endParaRPr lang="en-US" altLang="ja-JP" sz="2400" dirty="0"/>
+          </a:p>
+          <a:p>
+            <a:pPr marL="0" indent="0">
+              <a:buNone/>
+            </a:pPr>
+            <a:endParaRPr lang="en-US" altLang="ja-JP" sz="2400" dirty="0"/>
+          </a:p>
+          <a:p>
+            <a:pPr>
+              <a:buFontTx/>
+              <a:buChar char="-"/>
+            </a:pPr>
+            <a:endParaRPr lang="en-US" altLang="ja-JP" sz="2400" dirty="0"/>
+          </a:p>
+          <a:p>
+            <a:pPr>
+              <a:buFontTx/>
+              <a:buChar char="-"/>
+            </a:pPr>
+            <a:endParaRPr lang="en-US" altLang="ja-JP" sz="2400" dirty="0"/>
+          </a:p>
+          <a:p>
+            <a:pPr>
+              <a:buFontTx/>
+              <a:buChar char="-"/>
+            </a:pPr>
+            <a:endParaRPr lang="en-US" altLang="ja-JP" sz="2400" dirty="0"/>
+          </a:p>
+        </p:txBody>
+      </p:sp>
+      <p:pic>
+        <p:nvPicPr>
+          <p:cNvPr id="4" name="図 3">
+            <a:extLst>
+              <a:ext uri="{FF2B5EF4-FFF2-40B4-BE49-F238E27FC236}">
+                <a16:creationId xmlns:a16="http://schemas.microsoft.com/office/drawing/2014/main" id="{A27EC174-2CDA-B99D-713F-6907C7F831AD}"/>
+              </a:ext>
+            </a:extLst>
+          </p:cNvPr>
+          <p:cNvPicPr>
+            <a:picLocks noChangeAspect="1"/>
+          </p:cNvPicPr>
+          <p:nvPr/>
+        </p:nvPicPr>
+        <p:blipFill>
+          <a:blip r:embed="rId2"/>
+          <a:stretch>
+            <a:fillRect/>
+          </a:stretch>
+        </p:blipFill>
+        <p:spPr>
+          <a:xfrm>
+            <a:off x="6321170" y="2274503"/>
+            <a:ext cx="4658375" cy="3029373"/>
+          </a:xfrm>
+          <a:prstGeom prst="rect">
+            <a:avLst/>
+          </a:prstGeom>
+        </p:spPr>
+      </p:pic>
+    </p:spTree>
+    <p:extLst>
+      <p:ext uri="{BB962C8B-B14F-4D97-AF65-F5344CB8AC3E}">
+        <p14:creationId xmlns:p14="http://schemas.microsoft.com/office/powerpoint/2010/main" val="259682668"/>
+      </p:ext>
+    </p:extLst>
+  </p:cSld>
+  <p:clrMapOvr>
+    <a:masterClrMapping/>
+  </p:clrMapOvr>
+</p:sld>
+</file>
+
+<file path=ppt/slides/slide7.xml><?xml version="1.0" encoding="utf-8"?>
+<p:sld xmlns:a="http://schemas.openxmlformats.org/drawingml/2006/main" xmlns:r="http://schemas.openxmlformats.org/officeDocument/2006/relationships" xmlns:p="http://schemas.openxmlformats.org/presentationml/2006/main">
+  <p:cSld>
+    <p:spTree>
+      <p:nvGrpSpPr>
+        <p:cNvPr id="1" name=""/>
+        <p:cNvGrpSpPr/>
+        <p:nvPr/>
+      </p:nvGrpSpPr>
+      <p:grpSpPr>
+        <a:xfrm>
+          <a:off x="0" y="0"/>
+          <a:ext cx="0" cy="0"/>
+          <a:chOff x="0" y="0"/>
+          <a:chExt cx="0" cy="0"/>
+        </a:xfrm>
+      </p:grpSpPr>
+      <p:sp>
+        <p:nvSpPr>
+          <p:cNvPr id="2" name="タイトル 1">
+            <a:extLst>
+              <a:ext uri="{FF2B5EF4-FFF2-40B4-BE49-F238E27FC236}">
+                <a16:creationId xmlns:a16="http://schemas.microsoft.com/office/drawing/2014/main" id="{9C784ACA-9376-15C6-DD93-68B5D582FADA}"/>
+              </a:ext>
+            </a:extLst>
+          </p:cNvPr>
+          <p:cNvSpPr>
+            <a:spLocks noGrp="1"/>
+          </p:cNvSpPr>
+          <p:nvPr>
+            <p:ph type="title"/>
+          </p:nvPr>
+        </p:nvSpPr>
+        <p:spPr>
+          <a:xfrm>
+            <a:off x="838200" y="365126"/>
+            <a:ext cx="10515600" cy="891020"/>
+          </a:xfrm>
+        </p:spPr>
+        <p:txBody>
+          <a:bodyPr>
+            <a:normAutofit/>
+          </a:bodyPr>
+          <a:lstStyle/>
+          <a:p>
+            <a:r>
+              <a:rPr kumimoji="1" lang="en-US" altLang="ja-JP" dirty="0"/>
+              <a:t>HTTP/2</a:t>
+            </a:r>
+            <a:r>
+              <a:rPr kumimoji="1" lang="ja-JP" altLang="en-US" dirty="0"/>
+              <a:t>ベース</a:t>
+            </a:r>
+          </a:p>
+        </p:txBody>
+      </p:sp>
+      <p:sp>
+        <p:nvSpPr>
+          <p:cNvPr id="12" name="コンテンツ プレースホルダー 11">
+            <a:extLst>
+              <a:ext uri="{FF2B5EF4-FFF2-40B4-BE49-F238E27FC236}">
+                <a16:creationId xmlns:a16="http://schemas.microsoft.com/office/drawing/2014/main" id="{E944DFBB-A102-FEAA-D487-BCBEE3A4BD63}"/>
+              </a:ext>
+            </a:extLst>
+          </p:cNvPr>
+          <p:cNvSpPr>
+            <a:spLocks noGrp="1"/>
+          </p:cNvSpPr>
+          <p:nvPr>
+            <p:ph idx="1"/>
+          </p:nvPr>
+        </p:nvSpPr>
+        <p:spPr>
+          <a:xfrm>
+            <a:off x="838200" y="1401417"/>
+            <a:ext cx="10515600" cy="4775546"/>
+          </a:xfrm>
+        </p:spPr>
+        <p:txBody>
+          <a:bodyPr>
+            <a:normAutofit/>
+          </a:bodyPr>
+          <a:lstStyle/>
+          <a:p>
+            <a:r>
+              <a:rPr lang="en-US" altLang="ja-JP" dirty="0"/>
+              <a:t>HTTP/2</a:t>
+            </a:r>
+            <a:r>
+              <a:rPr lang="ja-JP" altLang="en-US" dirty="0"/>
+              <a:t>の多重化機能により</a:t>
+            </a:r>
+            <a:r>
+              <a:rPr lang="en-US" altLang="ja-JP" dirty="0"/>
+              <a:t>1</a:t>
+            </a:r>
+            <a:r>
+              <a:rPr lang="ja-JP" altLang="en-US" dirty="0"/>
+              <a:t>つの</a:t>
+            </a:r>
+            <a:r>
+              <a:rPr lang="en-US" altLang="ja-JP" dirty="0"/>
+              <a:t>TCP</a:t>
+            </a:r>
+            <a:r>
+              <a:rPr lang="ja-JP" altLang="en-US" dirty="0"/>
+              <a:t>接続で複数のリクエストを並列処理できます</a:t>
+            </a:r>
+            <a:endParaRPr lang="en-US" altLang="ja-JP" dirty="0"/>
+          </a:p>
+          <a:p>
+            <a:endParaRPr lang="ja-JP" altLang="en-US" dirty="0"/>
+          </a:p>
+          <a:p>
+            <a:r>
+              <a:rPr lang="ja-JP" altLang="en-US" dirty="0"/>
+              <a:t>ヘッダー圧縮によりオーバーヘッドが削減されます</a:t>
+            </a:r>
+            <a:endParaRPr lang="en-US" altLang="ja-JP" dirty="0"/>
+          </a:p>
+          <a:p>
+            <a:endParaRPr lang="ja-JP" altLang="en-US" dirty="0"/>
+          </a:p>
+          <a:p>
+            <a:r>
+              <a:rPr lang="ja-JP" altLang="en-US" dirty="0"/>
+              <a:t>双方向ストリーミングをサポートしています</a:t>
+            </a:r>
+          </a:p>
+          <a:p>
+            <a:pPr marL="0" indent="0">
+              <a:buNone/>
+            </a:pPr>
+            <a:br>
+              <a:rPr lang="ja-JP" altLang="en-US" dirty="0"/>
+            </a:br>
+            <a:endParaRPr lang="ja-JP" altLang="en-US" dirty="0"/>
+          </a:p>
+          <a:p>
+            <a:pPr marL="0" indent="0">
+              <a:buNone/>
+            </a:pPr>
+            <a:endParaRPr lang="en-US" altLang="ja-JP" sz="2400" dirty="0"/>
+          </a:p>
+          <a:p>
+            <a:pPr marL="0" indent="0">
+              <a:buNone/>
+            </a:pPr>
+            <a:endParaRPr lang="en-US" altLang="ja-JP" sz="2400" dirty="0"/>
+          </a:p>
+          <a:p>
+            <a:pPr marL="0" indent="0">
+              <a:buNone/>
+            </a:pPr>
+            <a:endParaRPr lang="en-US" altLang="ja-JP" sz="2400" dirty="0"/>
+          </a:p>
+          <a:p>
+            <a:pPr>
+              <a:buFontTx/>
+              <a:buChar char="-"/>
+            </a:pPr>
+            <a:endParaRPr lang="en-US" altLang="ja-JP" sz="2400" dirty="0"/>
+          </a:p>
+          <a:p>
+            <a:pPr>
+              <a:buFontTx/>
+              <a:buChar char="-"/>
+            </a:pPr>
+            <a:endParaRPr lang="en-US" altLang="ja-JP" sz="2400" dirty="0"/>
+          </a:p>
+          <a:p>
+            <a:pPr>
+              <a:buFontTx/>
+              <a:buChar char="-"/>
+            </a:pPr>
+            <a:endParaRPr lang="en-US" altLang="ja-JP" sz="2400" dirty="0"/>
+          </a:p>
+        </p:txBody>
+      </p:sp>
+    </p:spTree>
+    <p:extLst>
+      <p:ext uri="{BB962C8B-B14F-4D97-AF65-F5344CB8AC3E}">
+        <p14:creationId xmlns:p14="http://schemas.microsoft.com/office/powerpoint/2010/main" val="4154140404"/>
+      </p:ext>
+    </p:extLst>
+  </p:cSld>
+  <p:clrMapOvr>
+    <a:masterClrMapping/>
+  </p:clrMapOvr>
+</p:sld>
+</file>
+
+<file path=ppt/slides/slide8.xml><?xml version="1.0" encoding="utf-8"?>
+<p:sld xmlns:a="http://schemas.openxmlformats.org/drawingml/2006/main" xmlns:r="http://schemas.openxmlformats.org/officeDocument/2006/relationships" xmlns:p="http://schemas.openxmlformats.org/presentationml/2006/main">
+  <p:cSld>
+    <p:spTree>
+      <p:nvGrpSpPr>
+        <p:cNvPr id="1" name=""/>
+        <p:cNvGrpSpPr/>
+        <p:nvPr/>
+      </p:nvGrpSpPr>
+      <p:grpSpPr>
+        <a:xfrm>
+          <a:off x="0" y="0"/>
+          <a:ext cx="0" cy="0"/>
+          <a:chOff x="0" y="0"/>
+          <a:chExt cx="0" cy="0"/>
+        </a:xfrm>
+      </p:grpSpPr>
+      <p:sp>
+        <p:nvSpPr>
+          <p:cNvPr id="2" name="タイトル 1">
+            <a:extLst>
+              <a:ext uri="{FF2B5EF4-FFF2-40B4-BE49-F238E27FC236}">
+                <a16:creationId xmlns:a16="http://schemas.microsoft.com/office/drawing/2014/main" id="{9C784ACA-9376-15C6-DD93-68B5D582FADA}"/>
+              </a:ext>
+            </a:extLst>
+          </p:cNvPr>
+          <p:cNvSpPr>
+            <a:spLocks noGrp="1"/>
+          </p:cNvSpPr>
+          <p:nvPr>
+            <p:ph type="title"/>
+          </p:nvPr>
+        </p:nvSpPr>
+        <p:spPr>
+          <a:xfrm>
+            <a:off x="838200" y="365126"/>
+            <a:ext cx="10515600" cy="891020"/>
+          </a:xfrm>
+        </p:spPr>
+        <p:txBody>
+          <a:bodyPr>
+            <a:normAutofit/>
+          </a:bodyPr>
+          <a:lstStyle/>
+          <a:p>
+            <a:r>
+              <a:rPr kumimoji="1" lang="ja-JP" altLang="en-US" dirty="0"/>
+              <a:t>多言語対応</a:t>
+            </a:r>
+          </a:p>
+        </p:txBody>
+      </p:sp>
+      <p:sp>
+        <p:nvSpPr>
+          <p:cNvPr id="12" name="コンテンツ プレースホルダー 11">
+            <a:extLst>
+              <a:ext uri="{FF2B5EF4-FFF2-40B4-BE49-F238E27FC236}">
+                <a16:creationId xmlns:a16="http://schemas.microsoft.com/office/drawing/2014/main" id="{E944DFBB-A102-FEAA-D487-BCBEE3A4BD63}"/>
+              </a:ext>
+            </a:extLst>
+          </p:cNvPr>
+          <p:cNvSpPr>
+            <a:spLocks noGrp="1"/>
+          </p:cNvSpPr>
+          <p:nvPr>
+            <p:ph idx="1"/>
+          </p:nvPr>
+        </p:nvSpPr>
+        <p:spPr>
+          <a:xfrm>
+            <a:off x="838200" y="1401417"/>
+            <a:ext cx="10515600" cy="4775546"/>
+          </a:xfrm>
+        </p:spPr>
+        <p:txBody>
+          <a:bodyPr>
+            <a:normAutofit/>
+          </a:bodyPr>
+          <a:lstStyle/>
+          <a:p>
+            <a:r>
+              <a:rPr lang="en-US" altLang="ja-JP" dirty="0"/>
+              <a:t>C, C++, Java, Python, Go, Rust, C#</a:t>
+            </a:r>
+            <a:r>
+              <a:rPr lang="ja-JP" altLang="en-US" dirty="0"/>
+              <a:t>など多くの言語をサポートしています。</a:t>
+            </a:r>
+          </a:p>
+          <a:p>
+            <a:br>
+              <a:rPr lang="ja-JP" altLang="en-US" dirty="0"/>
+            </a:br>
+            <a:endParaRPr lang="ja-JP" altLang="en-US" dirty="0"/>
+          </a:p>
+          <a:p>
+            <a:pPr marL="0" indent="0">
+              <a:buNone/>
+            </a:pPr>
+            <a:endParaRPr lang="en-US" altLang="ja-JP" sz="2400" dirty="0"/>
+          </a:p>
+          <a:p>
+            <a:pPr marL="0" indent="0">
+              <a:buNone/>
+            </a:pPr>
+            <a:endParaRPr lang="en-US" altLang="ja-JP" sz="2400" dirty="0"/>
+          </a:p>
+          <a:p>
+            <a:pPr marL="0" indent="0">
+              <a:buNone/>
+            </a:pPr>
+            <a:endParaRPr lang="en-US" altLang="ja-JP" sz="2400" dirty="0"/>
+          </a:p>
+          <a:p>
+            <a:pPr>
+              <a:buFontTx/>
+              <a:buChar char="-"/>
+            </a:pPr>
+            <a:endParaRPr lang="en-US" altLang="ja-JP" sz="2400" dirty="0"/>
+          </a:p>
+          <a:p>
+            <a:pPr>
+              <a:buFontTx/>
+              <a:buChar char="-"/>
+            </a:pPr>
+            <a:endParaRPr lang="en-US" altLang="ja-JP" sz="2400" dirty="0"/>
+          </a:p>
+          <a:p>
+            <a:pPr>
+              <a:buFontTx/>
+              <a:buChar char="-"/>
+            </a:pPr>
+            <a:endParaRPr lang="en-US" altLang="ja-JP" sz="2400" dirty="0"/>
+          </a:p>
+        </p:txBody>
+      </p:sp>
+    </p:spTree>
+    <p:extLst>
+      <p:ext uri="{BB962C8B-B14F-4D97-AF65-F5344CB8AC3E}">
+        <p14:creationId xmlns:p14="http://schemas.microsoft.com/office/powerpoint/2010/main" val="2314387547"/>
       </p:ext>
     </p:extLst>
   </p:cSld>

</xml_diff>